<commit_message>
more manuscript work, sat and fc
</commit_message>
<xml_diff>
--- a/manu/schematics-v2.pptx
+++ b/manu/schematics-v2.pptx
@@ -244,7 +244,7 @@
           <a:p>
             <a:fld id="{C1479234-584E-4873-8CD3-B53B1333C3D5}" type="datetimeFigureOut">
               <a:rPr lang="en-US" smtClean="0"/>
-              <a:t>3/12/2021</a:t>
+              <a:t>3/15/2021</a:t>
             </a:fld>
             <a:endParaRPr lang="en-US"/>
           </a:p>
@@ -414,7 +414,7 @@
           <a:p>
             <a:fld id="{C1479234-584E-4873-8CD3-B53B1333C3D5}" type="datetimeFigureOut">
               <a:rPr lang="en-US" smtClean="0"/>
-              <a:t>3/12/2021</a:t>
+              <a:t>3/15/2021</a:t>
             </a:fld>
             <a:endParaRPr lang="en-US"/>
           </a:p>
@@ -594,7 +594,7 @@
           <a:p>
             <a:fld id="{C1479234-584E-4873-8CD3-B53B1333C3D5}" type="datetimeFigureOut">
               <a:rPr lang="en-US" smtClean="0"/>
-              <a:t>3/12/2021</a:t>
+              <a:t>3/15/2021</a:t>
             </a:fld>
             <a:endParaRPr lang="en-US"/>
           </a:p>
@@ -764,7 +764,7 @@
           <a:p>
             <a:fld id="{C1479234-584E-4873-8CD3-B53B1333C3D5}" type="datetimeFigureOut">
               <a:rPr lang="en-US" smtClean="0"/>
-              <a:t>3/12/2021</a:t>
+              <a:t>3/15/2021</a:t>
             </a:fld>
             <a:endParaRPr lang="en-US"/>
           </a:p>
@@ -1008,7 +1008,7 @@
           <a:p>
             <a:fld id="{C1479234-584E-4873-8CD3-B53B1333C3D5}" type="datetimeFigureOut">
               <a:rPr lang="en-US" smtClean="0"/>
-              <a:t>3/12/2021</a:t>
+              <a:t>3/15/2021</a:t>
             </a:fld>
             <a:endParaRPr lang="en-US"/>
           </a:p>
@@ -1240,7 +1240,7 @@
           <a:p>
             <a:fld id="{C1479234-584E-4873-8CD3-B53B1333C3D5}" type="datetimeFigureOut">
               <a:rPr lang="en-US" smtClean="0"/>
-              <a:t>3/12/2021</a:t>
+              <a:t>3/15/2021</a:t>
             </a:fld>
             <a:endParaRPr lang="en-US"/>
           </a:p>
@@ -1607,7 +1607,7 @@
           <a:p>
             <a:fld id="{C1479234-584E-4873-8CD3-B53B1333C3D5}" type="datetimeFigureOut">
               <a:rPr lang="en-US" smtClean="0"/>
-              <a:t>3/12/2021</a:t>
+              <a:t>3/15/2021</a:t>
             </a:fld>
             <a:endParaRPr lang="en-US"/>
           </a:p>
@@ -1725,7 +1725,7 @@
           <a:p>
             <a:fld id="{C1479234-584E-4873-8CD3-B53B1333C3D5}" type="datetimeFigureOut">
               <a:rPr lang="en-US" smtClean="0"/>
-              <a:t>3/12/2021</a:t>
+              <a:t>3/15/2021</a:t>
             </a:fld>
             <a:endParaRPr lang="en-US"/>
           </a:p>
@@ -1820,7 +1820,7 @@
           <a:p>
             <a:fld id="{C1479234-584E-4873-8CD3-B53B1333C3D5}" type="datetimeFigureOut">
               <a:rPr lang="en-US" smtClean="0"/>
-              <a:t>3/12/2021</a:t>
+              <a:t>3/15/2021</a:t>
             </a:fld>
             <a:endParaRPr lang="en-US"/>
           </a:p>
@@ -2097,7 +2097,7 @@
           <a:p>
             <a:fld id="{C1479234-584E-4873-8CD3-B53B1333C3D5}" type="datetimeFigureOut">
               <a:rPr lang="en-US" smtClean="0"/>
-              <a:t>3/12/2021</a:t>
+              <a:t>3/15/2021</a:t>
             </a:fld>
             <a:endParaRPr lang="en-US"/>
           </a:p>
@@ -2354,7 +2354,7 @@
           <a:p>
             <a:fld id="{C1479234-584E-4873-8CD3-B53B1333C3D5}" type="datetimeFigureOut">
               <a:rPr lang="en-US" smtClean="0"/>
-              <a:t>3/12/2021</a:t>
+              <a:t>3/15/2021</a:t>
             </a:fld>
             <a:endParaRPr lang="en-US"/>
           </a:p>
@@ -2567,7 +2567,7 @@
           <a:p>
             <a:fld id="{C1479234-584E-4873-8CD3-B53B1333C3D5}" type="datetimeFigureOut">
               <a:rPr lang="en-US" smtClean="0"/>
-              <a:t>3/12/2021</a:t>
+              <a:t>3/15/2021</a:t>
             </a:fld>
             <a:endParaRPr lang="en-US"/>
           </a:p>
@@ -2987,7 +2987,7 @@
         <p:spPr>
           <a:xfrm>
             <a:off x="501049" y="525877"/>
-            <a:ext cx="5754969" cy="276999"/>
+            <a:ext cx="5754969" cy="461665"/>
           </a:xfrm>
           <a:prstGeom prst="rect">
             <a:avLst/>
@@ -3001,2112 +3001,2431 @@
           <a:lstStyle/>
           <a:p>
             <a:r>
+              <a:rPr lang="en-US" sz="1200" dirty="0" smtClean="0"/>
+              <a:t>Proposed causal diagram for cover crop effects on </a:t>
+            </a:r>
+            <a:r>
+              <a:rPr lang="en-US" sz="1200" dirty="0" smtClean="0"/>
+              <a:t>(</a:t>
+            </a:r>
+            <a:r>
               <a:rPr lang="en-US" sz="1200" dirty="0"/>
-              <a:t>How could cover crops affect (1) Soil water at saturation, (2) soil water at field capacity</a:t>
-            </a:r>
-          </a:p>
-        </p:txBody>
-      </p:sp>
-      <p:grpSp>
-        <p:nvGrpSpPr>
-          <p:cNvPr id="4" name="Group 3">
+              <a:t>1) </a:t>
+            </a:r>
+            <a:r>
+              <a:rPr lang="en-US" sz="1200" dirty="0" smtClean="0"/>
+              <a:t>soil structure, (2) soil </a:t>
+            </a:r>
+            <a:r>
+              <a:rPr lang="en-US" sz="1200" dirty="0"/>
+              <a:t>water at saturation, </a:t>
+            </a:r>
+            <a:r>
+              <a:rPr lang="en-US" sz="1200" dirty="0" smtClean="0"/>
+              <a:t>and (3) </a:t>
+            </a:r>
+            <a:r>
+              <a:rPr lang="en-US" sz="1200" dirty="0"/>
+              <a:t>soil water at field capacity</a:t>
+            </a:r>
+          </a:p>
+        </p:txBody>
+      </p:sp>
+      <p:cxnSp>
+        <p:nvCxnSpPr>
+          <p:cNvPr id="74" name="Straight Arrow Connector 73">
             <a:extLst>
               <a:ext uri="{FF2B5EF4-FFF2-40B4-BE49-F238E27FC236}">
-                <a16:creationId xmlns:a16="http://schemas.microsoft.com/office/drawing/2014/main" id="{E694652C-B346-42FD-9030-8F5E5FCFBAF0}"/>
+                <a16:creationId xmlns:a16="http://schemas.microsoft.com/office/drawing/2014/main" id="{A98B12DB-AA79-4E4E-A4CC-5871BB899770}"/>
               </a:ext>
             </a:extLst>
           </p:cNvPr>
-          <p:cNvGrpSpPr/>
+          <p:cNvCxnSpPr>
+            <a:cxnSpLocks/>
+          </p:cNvCxnSpPr>
           <p:nvPr/>
-        </p:nvGrpSpPr>
-        <p:grpSpPr>
-          <a:xfrm>
-            <a:off x="733186" y="1358867"/>
-            <a:ext cx="4257847" cy="5666865"/>
-            <a:chOff x="733186" y="1358867"/>
-            <a:chExt cx="4257847" cy="5666865"/>
-          </a:xfrm>
-        </p:grpSpPr>
-        <p:cxnSp>
-          <p:nvCxnSpPr>
-            <p:cNvPr id="74" name="Straight Arrow Connector 73">
-              <a:extLst>
-                <a:ext uri="{FF2B5EF4-FFF2-40B4-BE49-F238E27FC236}">
-                  <a16:creationId xmlns:a16="http://schemas.microsoft.com/office/drawing/2014/main" id="{A98B12DB-AA79-4E4E-A4CC-5871BB899770}"/>
-                </a:ext>
-              </a:extLst>
-            </p:cNvPr>
-            <p:cNvCxnSpPr>
-              <a:cxnSpLocks/>
-            </p:cNvCxnSpPr>
-            <p:nvPr/>
-          </p:nvCxnSpPr>
-          <p:spPr>
-            <a:xfrm>
-              <a:off x="2027647" y="2415652"/>
-              <a:ext cx="1" cy="523281"/>
-            </a:xfrm>
-            <a:prstGeom prst="straightConnector1">
-              <a:avLst/>
-            </a:prstGeom>
-            <a:ln w="9525">
-              <a:solidFill>
-                <a:schemeClr val="tx1"/>
-              </a:solidFill>
-              <a:tailEnd type="triangle"/>
-            </a:ln>
-          </p:spPr>
-          <p:style>
-            <a:lnRef idx="1">
-              <a:schemeClr val="accent1"/>
-            </a:lnRef>
-            <a:fillRef idx="0">
-              <a:schemeClr val="accent1"/>
-            </a:fillRef>
-            <a:effectRef idx="0">
-              <a:schemeClr val="accent1"/>
-            </a:effectRef>
-            <a:fontRef idx="minor">
+        </p:nvCxnSpPr>
+        <p:spPr>
+          <a:xfrm>
+            <a:off x="2027647" y="2415652"/>
+            <a:ext cx="1" cy="523281"/>
+          </a:xfrm>
+          <a:prstGeom prst="straightConnector1">
+            <a:avLst/>
+          </a:prstGeom>
+          <a:ln w="9525">
+            <a:solidFill>
               <a:schemeClr val="tx1"/>
-            </a:fontRef>
-          </p:style>
-        </p:cxnSp>
-        <p:cxnSp>
-          <p:nvCxnSpPr>
-            <p:cNvPr id="167" name="Straight Arrow Connector 166">
-              <a:extLst>
-                <a:ext uri="{FF2B5EF4-FFF2-40B4-BE49-F238E27FC236}">
-                  <a16:creationId xmlns:a16="http://schemas.microsoft.com/office/drawing/2014/main" id="{29FB6EED-A2B4-4F11-B512-964E0FD4FA5E}"/>
-                </a:ext>
-              </a:extLst>
-            </p:cNvPr>
-            <p:cNvCxnSpPr>
-              <a:cxnSpLocks/>
-            </p:cNvCxnSpPr>
-            <p:nvPr/>
-          </p:nvCxnSpPr>
-          <p:spPr>
-            <a:xfrm>
-              <a:off x="1107145" y="3705724"/>
-              <a:ext cx="1265263" cy="0"/>
-            </a:xfrm>
-            <a:prstGeom prst="straightConnector1">
-              <a:avLst/>
-            </a:prstGeom>
-            <a:ln w="9525">
-              <a:solidFill>
-                <a:schemeClr val="tx1"/>
-              </a:solidFill>
-              <a:tailEnd type="triangle"/>
-            </a:ln>
-          </p:spPr>
-          <p:style>
-            <a:lnRef idx="1">
-              <a:schemeClr val="accent1"/>
-            </a:lnRef>
-            <a:fillRef idx="0">
-              <a:schemeClr val="accent1"/>
-            </a:fillRef>
-            <a:effectRef idx="0">
-              <a:schemeClr val="accent1"/>
-            </a:effectRef>
-            <a:fontRef idx="minor">
+            </a:solidFill>
+            <a:tailEnd type="triangle"/>
+          </a:ln>
+        </p:spPr>
+        <p:style>
+          <a:lnRef idx="1">
+            <a:schemeClr val="accent1"/>
+          </a:lnRef>
+          <a:fillRef idx="0">
+            <a:schemeClr val="accent1"/>
+          </a:fillRef>
+          <a:effectRef idx="0">
+            <a:schemeClr val="accent1"/>
+          </a:effectRef>
+          <a:fontRef idx="minor">
+            <a:schemeClr val="tx1"/>
+          </a:fontRef>
+        </p:style>
+      </p:cxnSp>
+      <p:cxnSp>
+        <p:nvCxnSpPr>
+          <p:cNvPr id="167" name="Straight Arrow Connector 166">
+            <a:extLst>
+              <a:ext uri="{FF2B5EF4-FFF2-40B4-BE49-F238E27FC236}">
+                <a16:creationId xmlns:a16="http://schemas.microsoft.com/office/drawing/2014/main" id="{29FB6EED-A2B4-4F11-B512-964E0FD4FA5E}"/>
+              </a:ext>
+            </a:extLst>
+          </p:cNvPr>
+          <p:cNvCxnSpPr>
+            <a:cxnSpLocks/>
+          </p:cNvCxnSpPr>
+          <p:nvPr/>
+        </p:nvCxnSpPr>
+        <p:spPr>
+          <a:xfrm>
+            <a:off x="1107145" y="3705724"/>
+            <a:ext cx="1265263" cy="0"/>
+          </a:xfrm>
+          <a:prstGeom prst="straightConnector1">
+            <a:avLst/>
+          </a:prstGeom>
+          <a:ln w="9525">
+            <a:solidFill>
               <a:schemeClr val="tx1"/>
-            </a:fontRef>
-          </p:style>
-        </p:cxnSp>
-        <p:cxnSp>
-          <p:nvCxnSpPr>
-            <p:cNvPr id="57" name="Straight Arrow Connector 56">
-              <a:extLst>
-                <a:ext uri="{FF2B5EF4-FFF2-40B4-BE49-F238E27FC236}">
-                  <a16:creationId xmlns:a16="http://schemas.microsoft.com/office/drawing/2014/main" id="{31BA66BD-48A8-4DD6-B57A-134D8438CFE3}"/>
-                </a:ext>
-              </a:extLst>
-            </p:cNvPr>
-            <p:cNvCxnSpPr>
-              <a:cxnSpLocks/>
-            </p:cNvCxnSpPr>
-            <p:nvPr/>
-          </p:nvCxnSpPr>
-          <p:spPr>
-            <a:xfrm>
-              <a:off x="1087787" y="2250106"/>
-              <a:ext cx="1" cy="696487"/>
-            </a:xfrm>
-            <a:prstGeom prst="straightConnector1">
-              <a:avLst/>
-            </a:prstGeom>
-            <a:ln w="9525">
-              <a:solidFill>
-                <a:schemeClr val="tx1"/>
-              </a:solidFill>
-              <a:tailEnd type="triangle"/>
-            </a:ln>
-          </p:spPr>
-          <p:style>
-            <a:lnRef idx="1">
-              <a:schemeClr val="accent1"/>
-            </a:lnRef>
-            <a:fillRef idx="0">
-              <a:schemeClr val="accent1"/>
-            </a:fillRef>
-            <a:effectRef idx="0">
-              <a:schemeClr val="accent1"/>
-            </a:effectRef>
-            <a:fontRef idx="minor">
+            </a:solidFill>
+            <a:tailEnd type="triangle"/>
+          </a:ln>
+        </p:spPr>
+        <p:style>
+          <a:lnRef idx="1">
+            <a:schemeClr val="accent1"/>
+          </a:lnRef>
+          <a:fillRef idx="0">
+            <a:schemeClr val="accent1"/>
+          </a:fillRef>
+          <a:effectRef idx="0">
+            <a:schemeClr val="accent1"/>
+          </a:effectRef>
+          <a:fontRef idx="minor">
+            <a:schemeClr val="tx1"/>
+          </a:fontRef>
+        </p:style>
+      </p:cxnSp>
+      <p:cxnSp>
+        <p:nvCxnSpPr>
+          <p:cNvPr id="57" name="Straight Arrow Connector 56">
+            <a:extLst>
+              <a:ext uri="{FF2B5EF4-FFF2-40B4-BE49-F238E27FC236}">
+                <a16:creationId xmlns:a16="http://schemas.microsoft.com/office/drawing/2014/main" id="{31BA66BD-48A8-4DD6-B57A-134D8438CFE3}"/>
+              </a:ext>
+            </a:extLst>
+          </p:cNvPr>
+          <p:cNvCxnSpPr>
+            <a:cxnSpLocks/>
+          </p:cNvCxnSpPr>
+          <p:nvPr/>
+        </p:nvCxnSpPr>
+        <p:spPr>
+          <a:xfrm>
+            <a:off x="1087787" y="2250106"/>
+            <a:ext cx="1" cy="696487"/>
+          </a:xfrm>
+          <a:prstGeom prst="straightConnector1">
+            <a:avLst/>
+          </a:prstGeom>
+          <a:ln w="9525">
+            <a:solidFill>
               <a:schemeClr val="tx1"/>
-            </a:fontRef>
-          </p:style>
-        </p:cxnSp>
-        <p:cxnSp>
-          <p:nvCxnSpPr>
-            <p:cNvPr id="59" name="Straight Arrow Connector 58">
-              <a:extLst>
-                <a:ext uri="{FF2B5EF4-FFF2-40B4-BE49-F238E27FC236}">
-                  <a16:creationId xmlns:a16="http://schemas.microsoft.com/office/drawing/2014/main" id="{04E70E58-42AC-4675-B455-935EC2D04F90}"/>
-                </a:ext>
-              </a:extLst>
-            </p:cNvPr>
-            <p:cNvCxnSpPr>
-              <a:cxnSpLocks/>
-            </p:cNvCxnSpPr>
-            <p:nvPr/>
-          </p:nvCxnSpPr>
-          <p:spPr>
-            <a:xfrm flipV="1">
-              <a:off x="3429364" y="2250155"/>
-              <a:ext cx="646511" cy="2062"/>
-            </a:xfrm>
-            <a:prstGeom prst="straightConnector1">
-              <a:avLst/>
-            </a:prstGeom>
-            <a:ln w="9525">
-              <a:solidFill>
-                <a:schemeClr val="tx1"/>
-              </a:solidFill>
-              <a:tailEnd type="triangle"/>
-            </a:ln>
-          </p:spPr>
-          <p:style>
-            <a:lnRef idx="1">
-              <a:schemeClr val="accent1"/>
-            </a:lnRef>
-            <a:fillRef idx="0">
-              <a:schemeClr val="accent1"/>
-            </a:fillRef>
-            <a:effectRef idx="0">
-              <a:schemeClr val="accent1"/>
-            </a:effectRef>
-            <a:fontRef idx="minor">
+            </a:solidFill>
+            <a:tailEnd type="triangle"/>
+          </a:ln>
+        </p:spPr>
+        <p:style>
+          <a:lnRef idx="1">
+            <a:schemeClr val="accent1"/>
+          </a:lnRef>
+          <a:fillRef idx="0">
+            <a:schemeClr val="accent1"/>
+          </a:fillRef>
+          <a:effectRef idx="0">
+            <a:schemeClr val="accent1"/>
+          </a:effectRef>
+          <a:fontRef idx="minor">
+            <a:schemeClr val="tx1"/>
+          </a:fontRef>
+        </p:style>
+      </p:cxnSp>
+      <p:cxnSp>
+        <p:nvCxnSpPr>
+          <p:cNvPr id="59" name="Straight Arrow Connector 58">
+            <a:extLst>
+              <a:ext uri="{FF2B5EF4-FFF2-40B4-BE49-F238E27FC236}">
+                <a16:creationId xmlns:a16="http://schemas.microsoft.com/office/drawing/2014/main" id="{04E70E58-42AC-4675-B455-935EC2D04F90}"/>
+              </a:ext>
+            </a:extLst>
+          </p:cNvPr>
+          <p:cNvCxnSpPr>
+            <a:cxnSpLocks/>
+          </p:cNvCxnSpPr>
+          <p:nvPr/>
+        </p:nvCxnSpPr>
+        <p:spPr>
+          <a:xfrm flipV="1">
+            <a:off x="3429364" y="2250155"/>
+            <a:ext cx="646511" cy="2062"/>
+          </a:xfrm>
+          <a:prstGeom prst="straightConnector1">
+            <a:avLst/>
+          </a:prstGeom>
+          <a:ln w="9525">
+            <a:solidFill>
               <a:schemeClr val="tx1"/>
-            </a:fontRef>
-          </p:style>
-        </p:cxnSp>
-        <p:cxnSp>
-          <p:nvCxnSpPr>
-            <p:cNvPr id="90" name="Straight Arrow Connector 89">
-              <a:extLst>
-                <a:ext uri="{FF2B5EF4-FFF2-40B4-BE49-F238E27FC236}">
-                  <a16:creationId xmlns:a16="http://schemas.microsoft.com/office/drawing/2014/main" id="{BB890F74-A463-4C40-A27B-35FB56527423}"/>
-                </a:ext>
-              </a:extLst>
-            </p:cNvPr>
-            <p:cNvCxnSpPr>
-              <a:cxnSpLocks/>
-            </p:cNvCxnSpPr>
-            <p:nvPr/>
-          </p:nvCxnSpPr>
-          <p:spPr>
-            <a:xfrm>
-              <a:off x="2037415" y="1494474"/>
-              <a:ext cx="1" cy="484673"/>
-            </a:xfrm>
-            <a:prstGeom prst="straightConnector1">
-              <a:avLst/>
-            </a:prstGeom>
-            <a:ln w="57150">
-              <a:solidFill>
-                <a:schemeClr val="tx1"/>
-              </a:solidFill>
-              <a:tailEnd type="triangle"/>
-            </a:ln>
-          </p:spPr>
-          <p:style>
-            <a:lnRef idx="1">
-              <a:schemeClr val="accent1"/>
-            </a:lnRef>
-            <a:fillRef idx="0">
-              <a:schemeClr val="accent1"/>
-            </a:fillRef>
-            <a:effectRef idx="0">
-              <a:schemeClr val="accent1"/>
-            </a:effectRef>
-            <a:fontRef idx="minor">
+            </a:solidFill>
+            <a:tailEnd type="triangle"/>
+          </a:ln>
+        </p:spPr>
+        <p:style>
+          <a:lnRef idx="1">
+            <a:schemeClr val="accent1"/>
+          </a:lnRef>
+          <a:fillRef idx="0">
+            <a:schemeClr val="accent1"/>
+          </a:fillRef>
+          <a:effectRef idx="0">
+            <a:schemeClr val="accent1"/>
+          </a:effectRef>
+          <a:fontRef idx="minor">
+            <a:schemeClr val="tx1"/>
+          </a:fontRef>
+        </p:style>
+      </p:cxnSp>
+      <p:cxnSp>
+        <p:nvCxnSpPr>
+          <p:cNvPr id="90" name="Straight Arrow Connector 89">
+            <a:extLst>
+              <a:ext uri="{FF2B5EF4-FFF2-40B4-BE49-F238E27FC236}">
+                <a16:creationId xmlns:a16="http://schemas.microsoft.com/office/drawing/2014/main" id="{BB890F74-A463-4C40-A27B-35FB56527423}"/>
+              </a:ext>
+            </a:extLst>
+          </p:cNvPr>
+          <p:cNvCxnSpPr>
+            <a:cxnSpLocks/>
+          </p:cNvCxnSpPr>
+          <p:nvPr/>
+        </p:nvCxnSpPr>
+        <p:spPr>
+          <a:xfrm>
+            <a:off x="2037415" y="1494474"/>
+            <a:ext cx="1" cy="484673"/>
+          </a:xfrm>
+          <a:prstGeom prst="straightConnector1">
+            <a:avLst/>
+          </a:prstGeom>
+          <a:ln w="57150">
+            <a:solidFill>
               <a:schemeClr val="tx1"/>
-            </a:fontRef>
-          </p:style>
-        </p:cxnSp>
-        <p:cxnSp>
-          <p:nvCxnSpPr>
-            <p:cNvPr id="91" name="Straight Arrow Connector 90">
-              <a:extLst>
-                <a:ext uri="{FF2B5EF4-FFF2-40B4-BE49-F238E27FC236}">
-                  <a16:creationId xmlns:a16="http://schemas.microsoft.com/office/drawing/2014/main" id="{7E40E1B6-6876-41B9-90D2-E708A7BFB424}"/>
-                </a:ext>
-              </a:extLst>
-            </p:cNvPr>
-            <p:cNvCxnSpPr>
-              <a:cxnSpLocks/>
-            </p:cNvCxnSpPr>
-            <p:nvPr/>
-          </p:nvCxnSpPr>
-          <p:spPr>
-            <a:xfrm>
-              <a:off x="3230175" y="1527232"/>
-              <a:ext cx="0" cy="460346"/>
-            </a:xfrm>
-            <a:prstGeom prst="straightConnector1">
-              <a:avLst/>
-            </a:prstGeom>
-            <a:ln w="57150">
-              <a:solidFill>
-                <a:schemeClr val="tx1"/>
-              </a:solidFill>
-              <a:tailEnd type="triangle"/>
-            </a:ln>
-          </p:spPr>
-          <p:style>
-            <a:lnRef idx="1">
-              <a:schemeClr val="accent1"/>
-            </a:lnRef>
-            <a:fillRef idx="0">
-              <a:schemeClr val="accent1"/>
-            </a:fillRef>
-            <a:effectRef idx="0">
-              <a:schemeClr val="accent1"/>
-            </a:effectRef>
-            <a:fontRef idx="minor">
+            </a:solidFill>
+            <a:tailEnd type="triangle"/>
+          </a:ln>
+        </p:spPr>
+        <p:style>
+          <a:lnRef idx="1">
+            <a:schemeClr val="accent1"/>
+          </a:lnRef>
+          <a:fillRef idx="0">
+            <a:schemeClr val="accent1"/>
+          </a:fillRef>
+          <a:effectRef idx="0">
+            <a:schemeClr val="accent1"/>
+          </a:effectRef>
+          <a:fontRef idx="minor">
+            <a:schemeClr val="tx1"/>
+          </a:fontRef>
+        </p:style>
+      </p:cxnSp>
+      <p:cxnSp>
+        <p:nvCxnSpPr>
+          <p:cNvPr id="91" name="Straight Arrow Connector 90">
+            <a:extLst>
+              <a:ext uri="{FF2B5EF4-FFF2-40B4-BE49-F238E27FC236}">
+                <a16:creationId xmlns:a16="http://schemas.microsoft.com/office/drawing/2014/main" id="{7E40E1B6-6876-41B9-90D2-E708A7BFB424}"/>
+              </a:ext>
+            </a:extLst>
+          </p:cNvPr>
+          <p:cNvCxnSpPr>
+            <a:cxnSpLocks/>
+          </p:cNvCxnSpPr>
+          <p:nvPr/>
+        </p:nvCxnSpPr>
+        <p:spPr>
+          <a:xfrm>
+            <a:off x="3230175" y="1527232"/>
+            <a:ext cx="0" cy="460346"/>
+          </a:xfrm>
+          <a:prstGeom prst="straightConnector1">
+            <a:avLst/>
+          </a:prstGeom>
+          <a:ln w="57150">
+            <a:solidFill>
               <a:schemeClr val="tx1"/>
-            </a:fontRef>
-          </p:style>
-        </p:cxnSp>
-        <p:cxnSp>
-          <p:nvCxnSpPr>
-            <p:cNvPr id="71" name="Straight Arrow Connector 70">
-              <a:extLst>
-                <a:ext uri="{FF2B5EF4-FFF2-40B4-BE49-F238E27FC236}">
-                  <a16:creationId xmlns:a16="http://schemas.microsoft.com/office/drawing/2014/main" id="{DFD09234-A006-4654-8ABC-244EFB2761F0}"/>
-                </a:ext>
-              </a:extLst>
-            </p:cNvPr>
-            <p:cNvCxnSpPr>
-              <a:cxnSpLocks/>
-            </p:cNvCxnSpPr>
-            <p:nvPr/>
-          </p:nvCxnSpPr>
-          <p:spPr>
-            <a:xfrm>
-              <a:off x="4447738" y="1536374"/>
-              <a:ext cx="0" cy="460346"/>
-            </a:xfrm>
-            <a:prstGeom prst="straightConnector1">
-              <a:avLst/>
-            </a:prstGeom>
-            <a:ln w="57150">
-              <a:solidFill>
-                <a:schemeClr val="tx1"/>
-              </a:solidFill>
-              <a:tailEnd type="triangle"/>
-            </a:ln>
-          </p:spPr>
-          <p:style>
-            <a:lnRef idx="1">
-              <a:schemeClr val="accent1"/>
-            </a:lnRef>
-            <a:fillRef idx="0">
-              <a:schemeClr val="accent1"/>
-            </a:fillRef>
-            <a:effectRef idx="0">
-              <a:schemeClr val="accent1"/>
-            </a:effectRef>
-            <a:fontRef idx="minor">
+            </a:solidFill>
+            <a:tailEnd type="triangle"/>
+          </a:ln>
+        </p:spPr>
+        <p:style>
+          <a:lnRef idx="1">
+            <a:schemeClr val="accent1"/>
+          </a:lnRef>
+          <a:fillRef idx="0">
+            <a:schemeClr val="accent1"/>
+          </a:fillRef>
+          <a:effectRef idx="0">
+            <a:schemeClr val="accent1"/>
+          </a:effectRef>
+          <a:fontRef idx="minor">
+            <a:schemeClr val="tx1"/>
+          </a:fontRef>
+        </p:style>
+      </p:cxnSp>
+      <p:cxnSp>
+        <p:nvCxnSpPr>
+          <p:cNvPr id="71" name="Straight Arrow Connector 70">
+            <a:extLst>
+              <a:ext uri="{FF2B5EF4-FFF2-40B4-BE49-F238E27FC236}">
+                <a16:creationId xmlns:a16="http://schemas.microsoft.com/office/drawing/2014/main" id="{DFD09234-A006-4654-8ABC-244EFB2761F0}"/>
+              </a:ext>
+            </a:extLst>
+          </p:cNvPr>
+          <p:cNvCxnSpPr>
+            <a:cxnSpLocks/>
+          </p:cNvCxnSpPr>
+          <p:nvPr/>
+        </p:nvCxnSpPr>
+        <p:spPr>
+          <a:xfrm>
+            <a:off x="4447738" y="1536374"/>
+            <a:ext cx="0" cy="460346"/>
+          </a:xfrm>
+          <a:prstGeom prst="straightConnector1">
+            <a:avLst/>
+          </a:prstGeom>
+          <a:ln w="57150">
+            <a:solidFill>
               <a:schemeClr val="tx1"/>
-            </a:fontRef>
-          </p:style>
-        </p:cxnSp>
-        <p:cxnSp>
-          <p:nvCxnSpPr>
-            <p:cNvPr id="78" name="Straight Arrow Connector 77">
-              <a:extLst>
-                <a:ext uri="{FF2B5EF4-FFF2-40B4-BE49-F238E27FC236}">
-                  <a16:creationId xmlns:a16="http://schemas.microsoft.com/office/drawing/2014/main" id="{BB5C003F-F11F-492B-B684-8A478E3C3DDB}"/>
-                </a:ext>
-              </a:extLst>
-            </p:cNvPr>
-            <p:cNvCxnSpPr>
-              <a:cxnSpLocks/>
-            </p:cNvCxnSpPr>
-            <p:nvPr/>
-          </p:nvCxnSpPr>
-          <p:spPr>
-            <a:xfrm>
-              <a:off x="1080462" y="4194435"/>
-              <a:ext cx="231741" cy="0"/>
-            </a:xfrm>
-            <a:prstGeom prst="straightConnector1">
-              <a:avLst/>
-            </a:prstGeom>
-            <a:ln w="9525">
-              <a:solidFill>
-                <a:schemeClr val="tx1"/>
-              </a:solidFill>
-              <a:tailEnd type="triangle"/>
-            </a:ln>
-          </p:spPr>
-          <p:style>
-            <a:lnRef idx="1">
-              <a:schemeClr val="accent1"/>
-            </a:lnRef>
-            <a:fillRef idx="0">
-              <a:schemeClr val="accent1"/>
-            </a:fillRef>
-            <a:effectRef idx="0">
-              <a:schemeClr val="accent1"/>
-            </a:effectRef>
-            <a:fontRef idx="minor">
+            </a:solidFill>
+            <a:tailEnd type="triangle"/>
+          </a:ln>
+        </p:spPr>
+        <p:style>
+          <a:lnRef idx="1">
+            <a:schemeClr val="accent1"/>
+          </a:lnRef>
+          <a:fillRef idx="0">
+            <a:schemeClr val="accent1"/>
+          </a:fillRef>
+          <a:effectRef idx="0">
+            <a:schemeClr val="accent1"/>
+          </a:effectRef>
+          <a:fontRef idx="minor">
+            <a:schemeClr val="tx1"/>
+          </a:fontRef>
+        </p:style>
+      </p:cxnSp>
+      <p:cxnSp>
+        <p:nvCxnSpPr>
+          <p:cNvPr id="78" name="Straight Arrow Connector 77">
+            <a:extLst>
+              <a:ext uri="{FF2B5EF4-FFF2-40B4-BE49-F238E27FC236}">
+                <a16:creationId xmlns:a16="http://schemas.microsoft.com/office/drawing/2014/main" id="{BB5C003F-F11F-492B-B684-8A478E3C3DDB}"/>
+              </a:ext>
+            </a:extLst>
+          </p:cNvPr>
+          <p:cNvCxnSpPr>
+            <a:cxnSpLocks/>
+          </p:cNvCxnSpPr>
+          <p:nvPr/>
+        </p:nvCxnSpPr>
+        <p:spPr>
+          <a:xfrm>
+            <a:off x="1080462" y="4194435"/>
+            <a:ext cx="231741" cy="0"/>
+          </a:xfrm>
+          <a:prstGeom prst="straightConnector1">
+            <a:avLst/>
+          </a:prstGeom>
+          <a:ln w="9525">
+            <a:solidFill>
               <a:schemeClr val="tx1"/>
-            </a:fontRef>
-          </p:style>
-        </p:cxnSp>
-        <p:sp>
-          <p:nvSpPr>
-            <p:cNvPr id="80" name="TextBox 79">
-              <a:extLst>
-                <a:ext uri="{FF2B5EF4-FFF2-40B4-BE49-F238E27FC236}">
-                  <a16:creationId xmlns:a16="http://schemas.microsoft.com/office/drawing/2014/main" id="{72EE2869-981E-46C6-AC7A-802D723EAF97}"/>
-                </a:ext>
-              </a:extLst>
-            </p:cNvPr>
-            <p:cNvSpPr txBox="1"/>
-            <p:nvPr/>
-          </p:nvSpPr>
-          <p:spPr>
-            <a:xfrm>
-              <a:off x="2308709" y="6471734"/>
-              <a:ext cx="779661" cy="553998"/>
-            </a:xfrm>
-            <a:prstGeom prst="rect">
-              <a:avLst/>
-            </a:prstGeom>
+            </a:solidFill>
+            <a:tailEnd type="triangle"/>
+          </a:ln>
+        </p:spPr>
+        <p:style>
+          <a:lnRef idx="1">
+            <a:schemeClr val="accent1"/>
+          </a:lnRef>
+          <a:fillRef idx="0">
+            <a:schemeClr val="accent1"/>
+          </a:fillRef>
+          <a:effectRef idx="0">
+            <a:schemeClr val="accent1"/>
+          </a:effectRef>
+          <a:fontRef idx="minor">
+            <a:schemeClr val="tx1"/>
+          </a:fontRef>
+        </p:style>
+      </p:cxnSp>
+      <p:sp>
+        <p:nvSpPr>
+          <p:cNvPr id="80" name="TextBox 79">
+            <a:extLst>
+              <a:ext uri="{FF2B5EF4-FFF2-40B4-BE49-F238E27FC236}">
+                <a16:creationId xmlns:a16="http://schemas.microsoft.com/office/drawing/2014/main" id="{72EE2869-981E-46C6-AC7A-802D723EAF97}"/>
+              </a:ext>
+            </a:extLst>
+          </p:cNvPr>
+          <p:cNvSpPr txBox="1"/>
+          <p:nvPr/>
+        </p:nvSpPr>
+        <p:spPr>
+          <a:xfrm>
+            <a:off x="2308709" y="6471734"/>
+            <a:ext cx="779661" cy="707886"/>
+          </a:xfrm>
+          <a:prstGeom prst="rect">
+            <a:avLst/>
+          </a:prstGeom>
+          <a:solidFill>
+            <a:schemeClr val="bg2"/>
+          </a:solidFill>
+          <a:ln w="9525">
             <a:solidFill>
-              <a:schemeClr val="bg2"/>
+              <a:schemeClr val="tx1"/>
             </a:solidFill>
-            <a:ln w="9525">
-              <a:solidFill>
-                <a:schemeClr val="tx1"/>
-              </a:solidFill>
-            </a:ln>
-          </p:spPr>
-          <p:txBody>
-            <a:bodyPr wrap="square" rtlCol="0">
-              <a:spAutoFit/>
-            </a:bodyPr>
-            <a:lstStyle/>
-            <a:p>
-              <a:pPr algn="ctr"/>
-              <a:r>
-                <a:rPr lang="en-US" sz="1000" dirty="0"/>
-                <a:t>Soil water at field capacity</a:t>
-              </a:r>
-            </a:p>
-          </p:txBody>
-        </p:sp>
-        <p:sp>
-          <p:nvSpPr>
-            <p:cNvPr id="88" name="TextBox 87">
-              <a:extLst>
-                <a:ext uri="{FF2B5EF4-FFF2-40B4-BE49-F238E27FC236}">
-                  <a16:creationId xmlns:a16="http://schemas.microsoft.com/office/drawing/2014/main" id="{A39D2850-50A4-44CE-90DE-AD3BCB951000}"/>
-                </a:ext>
-              </a:extLst>
-            </p:cNvPr>
-            <p:cNvSpPr txBox="1"/>
-            <p:nvPr/>
-          </p:nvSpPr>
-          <p:spPr>
-            <a:xfrm>
-              <a:off x="4169863" y="5804934"/>
-              <a:ext cx="769153" cy="400110"/>
-            </a:xfrm>
-            <a:prstGeom prst="rect">
-              <a:avLst/>
-            </a:prstGeom>
+          </a:ln>
+        </p:spPr>
+        <p:txBody>
+          <a:bodyPr wrap="square" rtlCol="0">
+            <a:spAutoFit/>
+          </a:bodyPr>
+          <a:lstStyle/>
+          <a:p>
+            <a:pPr algn="ctr"/>
+            <a:r>
+              <a:rPr lang="en-US" sz="1000" dirty="0" smtClean="0"/>
+              <a:t>(3) Soil </a:t>
+            </a:r>
+            <a:r>
+              <a:rPr lang="en-US" sz="1000" dirty="0"/>
+              <a:t>water at field capacity</a:t>
+            </a:r>
+          </a:p>
+        </p:txBody>
+      </p:sp>
+      <p:sp>
+        <p:nvSpPr>
+          <p:cNvPr id="88" name="TextBox 87">
+            <a:extLst>
+              <a:ext uri="{FF2B5EF4-FFF2-40B4-BE49-F238E27FC236}">
+                <a16:creationId xmlns:a16="http://schemas.microsoft.com/office/drawing/2014/main" id="{A39D2850-50A4-44CE-90DE-AD3BCB951000}"/>
+              </a:ext>
+            </a:extLst>
+          </p:cNvPr>
+          <p:cNvSpPr txBox="1"/>
+          <p:nvPr/>
+        </p:nvSpPr>
+        <p:spPr>
+          <a:xfrm>
+            <a:off x="4169863" y="5804934"/>
+            <a:ext cx="769153" cy="400110"/>
+          </a:xfrm>
+          <a:prstGeom prst="rect">
+            <a:avLst/>
+          </a:prstGeom>
+          <a:solidFill>
+            <a:schemeClr val="accent2"/>
+          </a:solidFill>
+          <a:ln w="9525">
             <a:solidFill>
-              <a:schemeClr val="accent2"/>
+              <a:schemeClr val="tx1"/>
             </a:solidFill>
-            <a:ln w="9525">
-              <a:solidFill>
-                <a:schemeClr val="tx1"/>
-              </a:solidFill>
-            </a:ln>
-          </p:spPr>
-          <p:txBody>
-            <a:bodyPr wrap="square" rtlCol="0">
-              <a:spAutoFit/>
-            </a:bodyPr>
-            <a:lstStyle/>
-            <a:p>
-              <a:pPr algn="ctr"/>
-              <a:r>
-                <a:rPr lang="en-US" sz="1000" dirty="0"/>
-                <a:t>Soil air space</a:t>
-              </a:r>
-            </a:p>
-          </p:txBody>
-        </p:sp>
-        <p:cxnSp>
-          <p:nvCxnSpPr>
-            <p:cNvPr id="11" name="Straight Connector 10">
-              <a:extLst>
-                <a:ext uri="{FF2B5EF4-FFF2-40B4-BE49-F238E27FC236}">
-                  <a16:creationId xmlns:a16="http://schemas.microsoft.com/office/drawing/2014/main" id="{0712DFD0-8832-4922-BFE1-45B491651EC5}"/>
-                </a:ext>
-              </a:extLst>
-            </p:cNvPr>
-            <p:cNvCxnSpPr>
-              <a:cxnSpLocks/>
-            </p:cNvCxnSpPr>
-            <p:nvPr/>
-          </p:nvCxnSpPr>
-          <p:spPr>
-            <a:xfrm>
-              <a:off x="4022458" y="5203997"/>
-              <a:ext cx="0" cy="0"/>
-            </a:xfrm>
-            <a:prstGeom prst="line">
-              <a:avLst/>
-            </a:prstGeom>
-            <a:ln w="9525"/>
-          </p:spPr>
-          <p:style>
-            <a:lnRef idx="1">
-              <a:schemeClr val="accent1"/>
-            </a:lnRef>
-            <a:fillRef idx="0">
-              <a:schemeClr val="accent1"/>
-            </a:fillRef>
-            <a:effectRef idx="0">
-              <a:schemeClr val="accent1"/>
-            </a:effectRef>
-            <a:fontRef idx="minor">
+          </a:ln>
+        </p:spPr>
+        <p:txBody>
+          <a:bodyPr wrap="square" rtlCol="0">
+            <a:spAutoFit/>
+          </a:bodyPr>
+          <a:lstStyle/>
+          <a:p>
+            <a:pPr algn="ctr"/>
+            <a:r>
+              <a:rPr lang="en-US" sz="1000" dirty="0"/>
+              <a:t>Soil air space</a:t>
+            </a:r>
+          </a:p>
+        </p:txBody>
+      </p:sp>
+      <p:cxnSp>
+        <p:nvCxnSpPr>
+          <p:cNvPr id="11" name="Straight Connector 10">
+            <a:extLst>
+              <a:ext uri="{FF2B5EF4-FFF2-40B4-BE49-F238E27FC236}">
+                <a16:creationId xmlns:a16="http://schemas.microsoft.com/office/drawing/2014/main" id="{0712DFD0-8832-4922-BFE1-45B491651EC5}"/>
+              </a:ext>
+            </a:extLst>
+          </p:cNvPr>
+          <p:cNvCxnSpPr>
+            <a:cxnSpLocks/>
+          </p:cNvCxnSpPr>
+          <p:nvPr/>
+        </p:nvCxnSpPr>
+        <p:spPr>
+          <a:xfrm>
+            <a:off x="4022458" y="5203997"/>
+            <a:ext cx="0" cy="0"/>
+          </a:xfrm>
+          <a:prstGeom prst="line">
+            <a:avLst/>
+          </a:prstGeom>
+          <a:ln w="9525"/>
+        </p:spPr>
+        <p:style>
+          <a:lnRef idx="1">
+            <a:schemeClr val="accent1"/>
+          </a:lnRef>
+          <a:fillRef idx="0">
+            <a:schemeClr val="accent1"/>
+          </a:fillRef>
+          <a:effectRef idx="0">
+            <a:schemeClr val="accent1"/>
+          </a:effectRef>
+          <a:fontRef idx="minor">
+            <a:schemeClr val="tx1"/>
+          </a:fontRef>
+        </p:style>
+      </p:cxnSp>
+      <p:cxnSp>
+        <p:nvCxnSpPr>
+          <p:cNvPr id="98" name="Straight Arrow Connector 97">
+            <a:extLst>
+              <a:ext uri="{FF2B5EF4-FFF2-40B4-BE49-F238E27FC236}">
+                <a16:creationId xmlns:a16="http://schemas.microsoft.com/office/drawing/2014/main" id="{520CA070-C7C7-4D3F-97F9-4CF91EF220D6}"/>
+              </a:ext>
+            </a:extLst>
+          </p:cNvPr>
+          <p:cNvCxnSpPr>
+            <a:cxnSpLocks/>
+          </p:cNvCxnSpPr>
+          <p:nvPr/>
+        </p:nvCxnSpPr>
+        <p:spPr>
+          <a:xfrm flipH="1">
+            <a:off x="3331775" y="5170330"/>
+            <a:ext cx="2283" cy="299371"/>
+          </a:xfrm>
+          <a:prstGeom prst="straightConnector1">
+            <a:avLst/>
+          </a:prstGeom>
+          <a:ln w="9525">
+            <a:solidFill>
               <a:schemeClr val="tx1"/>
-            </a:fontRef>
-          </p:style>
-        </p:cxnSp>
-        <p:cxnSp>
-          <p:nvCxnSpPr>
-            <p:cNvPr id="98" name="Straight Arrow Connector 97">
-              <a:extLst>
-                <a:ext uri="{FF2B5EF4-FFF2-40B4-BE49-F238E27FC236}">
-                  <a16:creationId xmlns:a16="http://schemas.microsoft.com/office/drawing/2014/main" id="{520CA070-C7C7-4D3F-97F9-4CF91EF220D6}"/>
-                </a:ext>
-              </a:extLst>
-            </p:cNvPr>
-            <p:cNvCxnSpPr>
-              <a:cxnSpLocks/>
-            </p:cNvCxnSpPr>
-            <p:nvPr/>
-          </p:nvCxnSpPr>
-          <p:spPr>
-            <a:xfrm flipH="1">
-              <a:off x="3331775" y="5170330"/>
-              <a:ext cx="2283" cy="299371"/>
-            </a:xfrm>
-            <a:prstGeom prst="straightConnector1">
-              <a:avLst/>
-            </a:prstGeom>
-            <a:ln w="9525">
-              <a:solidFill>
-                <a:schemeClr val="tx1"/>
-              </a:solidFill>
-              <a:tailEnd type="triangle"/>
-            </a:ln>
-          </p:spPr>
-          <p:style>
-            <a:lnRef idx="1">
-              <a:schemeClr val="accent1"/>
-            </a:lnRef>
-            <a:fillRef idx="0">
-              <a:schemeClr val="accent1"/>
-            </a:fillRef>
-            <a:effectRef idx="0">
-              <a:schemeClr val="accent1"/>
-            </a:effectRef>
-            <a:fontRef idx="minor">
+            </a:solidFill>
+            <a:tailEnd type="triangle"/>
+          </a:ln>
+        </p:spPr>
+        <p:style>
+          <a:lnRef idx="1">
+            <a:schemeClr val="accent1"/>
+          </a:lnRef>
+          <a:fillRef idx="0">
+            <a:schemeClr val="accent1"/>
+          </a:fillRef>
+          <a:effectRef idx="0">
+            <a:schemeClr val="accent1"/>
+          </a:effectRef>
+          <a:fontRef idx="minor">
+            <a:schemeClr val="tx1"/>
+          </a:fontRef>
+        </p:style>
+      </p:cxnSp>
+      <p:cxnSp>
+        <p:nvCxnSpPr>
+          <p:cNvPr id="106" name="Straight Arrow Connector 105">
+            <a:extLst>
+              <a:ext uri="{FF2B5EF4-FFF2-40B4-BE49-F238E27FC236}">
+                <a16:creationId xmlns:a16="http://schemas.microsoft.com/office/drawing/2014/main" id="{8CAB5DDE-1F61-4056-BA35-2C7C17ABB411}"/>
+              </a:ext>
+            </a:extLst>
+          </p:cNvPr>
+          <p:cNvCxnSpPr>
+            <a:cxnSpLocks/>
+          </p:cNvCxnSpPr>
+          <p:nvPr/>
+        </p:nvCxnSpPr>
+        <p:spPr>
+          <a:xfrm>
+            <a:off x="1979211" y="4050461"/>
+            <a:ext cx="378140" cy="0"/>
+          </a:xfrm>
+          <a:prstGeom prst="straightConnector1">
+            <a:avLst/>
+          </a:prstGeom>
+          <a:ln w="9525">
+            <a:solidFill>
               <a:schemeClr val="tx1"/>
-            </a:fontRef>
-          </p:style>
-        </p:cxnSp>
-        <p:cxnSp>
-          <p:nvCxnSpPr>
-            <p:cNvPr id="106" name="Straight Arrow Connector 105">
-              <a:extLst>
-                <a:ext uri="{FF2B5EF4-FFF2-40B4-BE49-F238E27FC236}">
-                  <a16:creationId xmlns:a16="http://schemas.microsoft.com/office/drawing/2014/main" id="{8CAB5DDE-1F61-4056-BA35-2C7C17ABB411}"/>
-                </a:ext>
-              </a:extLst>
-            </p:cNvPr>
-            <p:cNvCxnSpPr>
-              <a:cxnSpLocks/>
-            </p:cNvCxnSpPr>
-            <p:nvPr/>
-          </p:nvCxnSpPr>
-          <p:spPr>
-            <a:xfrm>
-              <a:off x="1979211" y="4050461"/>
-              <a:ext cx="378140" cy="0"/>
-            </a:xfrm>
-            <a:prstGeom prst="straightConnector1">
-              <a:avLst/>
-            </a:prstGeom>
-            <a:ln w="9525">
-              <a:solidFill>
-                <a:schemeClr val="tx1"/>
-              </a:solidFill>
-              <a:tailEnd type="triangle"/>
-            </a:ln>
-          </p:spPr>
-          <p:style>
-            <a:lnRef idx="1">
-              <a:schemeClr val="accent1"/>
-            </a:lnRef>
-            <a:fillRef idx="0">
-              <a:schemeClr val="accent1"/>
-            </a:fillRef>
-            <a:effectRef idx="0">
-              <a:schemeClr val="accent1"/>
-            </a:effectRef>
-            <a:fontRef idx="minor">
+            </a:solidFill>
+            <a:tailEnd type="triangle"/>
+          </a:ln>
+        </p:spPr>
+        <p:style>
+          <a:lnRef idx="1">
+            <a:schemeClr val="accent1"/>
+          </a:lnRef>
+          <a:fillRef idx="0">
+            <a:schemeClr val="accent1"/>
+          </a:fillRef>
+          <a:effectRef idx="0">
+            <a:schemeClr val="accent1"/>
+          </a:effectRef>
+          <a:fontRef idx="minor">
+            <a:schemeClr val="tx1"/>
+          </a:fontRef>
+        </p:style>
+      </p:cxnSp>
+      <p:cxnSp>
+        <p:nvCxnSpPr>
+          <p:cNvPr id="110" name="Straight Arrow Connector 109">
+            <a:extLst>
+              <a:ext uri="{FF2B5EF4-FFF2-40B4-BE49-F238E27FC236}">
+                <a16:creationId xmlns:a16="http://schemas.microsoft.com/office/drawing/2014/main" id="{6A13596A-C939-4CBE-A6B5-C323C197012A}"/>
+              </a:ext>
+            </a:extLst>
+          </p:cNvPr>
+          <p:cNvCxnSpPr>
+            <a:cxnSpLocks/>
+          </p:cNvCxnSpPr>
+          <p:nvPr/>
+        </p:nvCxnSpPr>
+        <p:spPr>
+          <a:xfrm flipH="1">
+            <a:off x="4554440" y="5253183"/>
+            <a:ext cx="2283" cy="530354"/>
+          </a:xfrm>
+          <a:prstGeom prst="straightConnector1">
+            <a:avLst/>
+          </a:prstGeom>
+          <a:ln w="9525">
+            <a:solidFill>
               <a:schemeClr val="tx1"/>
-            </a:fontRef>
-          </p:style>
-        </p:cxnSp>
-        <p:cxnSp>
-          <p:nvCxnSpPr>
-            <p:cNvPr id="110" name="Straight Arrow Connector 109">
-              <a:extLst>
-                <a:ext uri="{FF2B5EF4-FFF2-40B4-BE49-F238E27FC236}">
-                  <a16:creationId xmlns:a16="http://schemas.microsoft.com/office/drawing/2014/main" id="{6A13596A-C939-4CBE-A6B5-C323C197012A}"/>
-                </a:ext>
-              </a:extLst>
-            </p:cNvPr>
-            <p:cNvCxnSpPr>
-              <a:cxnSpLocks/>
-            </p:cNvCxnSpPr>
-            <p:nvPr/>
-          </p:nvCxnSpPr>
-          <p:spPr>
-            <a:xfrm flipH="1">
-              <a:off x="4554440" y="5253183"/>
-              <a:ext cx="2283" cy="530354"/>
-            </a:xfrm>
-            <a:prstGeom prst="straightConnector1">
-              <a:avLst/>
-            </a:prstGeom>
-            <a:ln w="9525">
-              <a:solidFill>
-                <a:schemeClr val="tx1"/>
-              </a:solidFill>
-              <a:tailEnd type="triangle"/>
-            </a:ln>
-          </p:spPr>
-          <p:style>
-            <a:lnRef idx="1">
-              <a:schemeClr val="accent1"/>
-            </a:lnRef>
-            <a:fillRef idx="0">
-              <a:schemeClr val="accent1"/>
-            </a:fillRef>
-            <a:effectRef idx="0">
-              <a:schemeClr val="accent1"/>
-            </a:effectRef>
-            <a:fontRef idx="minor">
+            </a:solidFill>
+            <a:tailEnd type="triangle"/>
+          </a:ln>
+        </p:spPr>
+        <p:style>
+          <a:lnRef idx="1">
+            <a:schemeClr val="accent1"/>
+          </a:lnRef>
+          <a:fillRef idx="0">
+            <a:schemeClr val="accent1"/>
+          </a:fillRef>
+          <a:effectRef idx="0">
+            <a:schemeClr val="accent1"/>
+          </a:effectRef>
+          <a:fontRef idx="minor">
+            <a:schemeClr val="tx1"/>
+          </a:fontRef>
+        </p:style>
+      </p:cxnSp>
+      <p:cxnSp>
+        <p:nvCxnSpPr>
+          <p:cNvPr id="137" name="Straight Arrow Connector 136">
+            <a:extLst>
+              <a:ext uri="{FF2B5EF4-FFF2-40B4-BE49-F238E27FC236}">
+                <a16:creationId xmlns:a16="http://schemas.microsoft.com/office/drawing/2014/main" id="{0F6BD93F-2EFA-49FF-85C2-C755174ABBA9}"/>
+              </a:ext>
+            </a:extLst>
+          </p:cNvPr>
+          <p:cNvCxnSpPr>
+            <a:cxnSpLocks/>
+          </p:cNvCxnSpPr>
+          <p:nvPr/>
+        </p:nvCxnSpPr>
+        <p:spPr>
+          <a:xfrm>
+            <a:off x="2690483" y="3216170"/>
+            <a:ext cx="1" cy="393149"/>
+          </a:xfrm>
+          <a:prstGeom prst="straightConnector1">
+            <a:avLst/>
+          </a:prstGeom>
+          <a:ln w="9525">
+            <a:solidFill>
               <a:schemeClr val="tx1"/>
-            </a:fontRef>
-          </p:style>
-        </p:cxnSp>
-        <p:cxnSp>
-          <p:nvCxnSpPr>
-            <p:cNvPr id="137" name="Straight Arrow Connector 136">
-              <a:extLst>
-                <a:ext uri="{FF2B5EF4-FFF2-40B4-BE49-F238E27FC236}">
-                  <a16:creationId xmlns:a16="http://schemas.microsoft.com/office/drawing/2014/main" id="{0F6BD93F-2EFA-49FF-85C2-C755174ABBA9}"/>
-                </a:ext>
-              </a:extLst>
-            </p:cNvPr>
-            <p:cNvCxnSpPr>
-              <a:cxnSpLocks/>
-            </p:cNvCxnSpPr>
-            <p:nvPr/>
-          </p:nvCxnSpPr>
-          <p:spPr>
-            <a:xfrm>
-              <a:off x="2690483" y="3216170"/>
-              <a:ext cx="1" cy="393149"/>
-            </a:xfrm>
-            <a:prstGeom prst="straightConnector1">
-              <a:avLst/>
-            </a:prstGeom>
-            <a:ln w="9525">
-              <a:solidFill>
-                <a:schemeClr val="tx1"/>
-              </a:solidFill>
-              <a:tailEnd type="triangle"/>
-            </a:ln>
-          </p:spPr>
-          <p:style>
-            <a:lnRef idx="1">
-              <a:schemeClr val="accent1"/>
-            </a:lnRef>
-            <a:fillRef idx="0">
-              <a:schemeClr val="accent1"/>
-            </a:fillRef>
-            <a:effectRef idx="0">
-              <a:schemeClr val="accent1"/>
-            </a:effectRef>
-            <a:fontRef idx="minor">
+            </a:solidFill>
+            <a:tailEnd type="triangle"/>
+          </a:ln>
+        </p:spPr>
+        <p:style>
+          <a:lnRef idx="1">
+            <a:schemeClr val="accent1"/>
+          </a:lnRef>
+          <a:fillRef idx="0">
+            <a:schemeClr val="accent1"/>
+          </a:fillRef>
+          <a:effectRef idx="0">
+            <a:schemeClr val="accent1"/>
+          </a:effectRef>
+          <a:fontRef idx="minor">
+            <a:schemeClr val="tx1"/>
+          </a:fontRef>
+        </p:style>
+      </p:cxnSp>
+      <p:cxnSp>
+        <p:nvCxnSpPr>
+          <p:cNvPr id="139" name="Straight Arrow Connector 138">
+            <a:extLst>
+              <a:ext uri="{FF2B5EF4-FFF2-40B4-BE49-F238E27FC236}">
+                <a16:creationId xmlns:a16="http://schemas.microsoft.com/office/drawing/2014/main" id="{AB2DECDF-FA1B-4A8D-9B89-6F5D9907AB97}"/>
+              </a:ext>
+            </a:extLst>
+          </p:cNvPr>
+          <p:cNvCxnSpPr>
+            <a:cxnSpLocks/>
+          </p:cNvCxnSpPr>
+          <p:nvPr/>
+        </p:nvCxnSpPr>
+        <p:spPr>
+          <a:xfrm flipH="1">
+            <a:off x="4554439" y="6196981"/>
+            <a:ext cx="2283" cy="329308"/>
+          </a:xfrm>
+          <a:prstGeom prst="straightConnector1">
+            <a:avLst/>
+          </a:prstGeom>
+          <a:ln w="9525">
+            <a:solidFill>
               <a:schemeClr val="tx1"/>
-            </a:fontRef>
-          </p:style>
-        </p:cxnSp>
-        <p:cxnSp>
-          <p:nvCxnSpPr>
-            <p:cNvPr id="139" name="Straight Arrow Connector 138">
-              <a:extLst>
-                <a:ext uri="{FF2B5EF4-FFF2-40B4-BE49-F238E27FC236}">
-                  <a16:creationId xmlns:a16="http://schemas.microsoft.com/office/drawing/2014/main" id="{AB2DECDF-FA1B-4A8D-9B89-6F5D9907AB97}"/>
-                </a:ext>
-              </a:extLst>
-            </p:cNvPr>
-            <p:cNvCxnSpPr>
-              <a:cxnSpLocks/>
-            </p:cNvCxnSpPr>
-            <p:nvPr/>
-          </p:nvCxnSpPr>
-          <p:spPr>
-            <a:xfrm flipH="1">
-              <a:off x="4554439" y="6196981"/>
-              <a:ext cx="2283" cy="329308"/>
-            </a:xfrm>
-            <a:prstGeom prst="straightConnector1">
-              <a:avLst/>
-            </a:prstGeom>
-            <a:ln w="9525">
-              <a:solidFill>
-                <a:schemeClr val="tx1"/>
-              </a:solidFill>
-              <a:tailEnd type="triangle"/>
-            </a:ln>
-          </p:spPr>
-          <p:style>
-            <a:lnRef idx="1">
-              <a:schemeClr val="accent1"/>
-            </a:lnRef>
-            <a:fillRef idx="0">
-              <a:schemeClr val="accent1"/>
-            </a:fillRef>
-            <a:effectRef idx="0">
-              <a:schemeClr val="accent1"/>
-            </a:effectRef>
-            <a:fontRef idx="minor">
+            </a:solidFill>
+            <a:tailEnd type="triangle"/>
+          </a:ln>
+        </p:spPr>
+        <p:style>
+          <a:lnRef idx="1">
+            <a:schemeClr val="accent1"/>
+          </a:lnRef>
+          <a:fillRef idx="0">
+            <a:schemeClr val="accent1"/>
+          </a:fillRef>
+          <a:effectRef idx="0">
+            <a:schemeClr val="accent1"/>
+          </a:effectRef>
+          <a:fontRef idx="minor">
+            <a:schemeClr val="tx1"/>
+          </a:fontRef>
+        </p:style>
+      </p:cxnSp>
+      <p:cxnSp>
+        <p:nvCxnSpPr>
+          <p:cNvPr id="143" name="Straight Connector 142">
+            <a:extLst>
+              <a:ext uri="{FF2B5EF4-FFF2-40B4-BE49-F238E27FC236}">
+                <a16:creationId xmlns:a16="http://schemas.microsoft.com/office/drawing/2014/main" id="{6627E756-A242-4A41-8E25-A9CA05261A15}"/>
+              </a:ext>
+            </a:extLst>
+          </p:cNvPr>
+          <p:cNvCxnSpPr>
+            <a:cxnSpLocks/>
+          </p:cNvCxnSpPr>
+          <p:nvPr/>
+        </p:nvCxnSpPr>
+        <p:spPr>
+          <a:xfrm>
+            <a:off x="1089628" y="2251170"/>
+            <a:ext cx="649490" cy="0"/>
+          </a:xfrm>
+          <a:prstGeom prst="line">
+            <a:avLst/>
+          </a:prstGeom>
+          <a:ln w="9525">
+            <a:solidFill>
               <a:schemeClr val="tx1"/>
-            </a:fontRef>
-          </p:style>
-        </p:cxnSp>
-        <p:cxnSp>
-          <p:nvCxnSpPr>
-            <p:cNvPr id="143" name="Straight Connector 142">
-              <a:extLst>
-                <a:ext uri="{FF2B5EF4-FFF2-40B4-BE49-F238E27FC236}">
-                  <a16:creationId xmlns:a16="http://schemas.microsoft.com/office/drawing/2014/main" id="{6627E756-A242-4A41-8E25-A9CA05261A15}"/>
-                </a:ext>
-              </a:extLst>
-            </p:cNvPr>
-            <p:cNvCxnSpPr>
-              <a:cxnSpLocks/>
-            </p:cNvCxnSpPr>
-            <p:nvPr/>
-          </p:nvCxnSpPr>
-          <p:spPr>
-            <a:xfrm>
-              <a:off x="1089628" y="2251170"/>
-              <a:ext cx="649490" cy="0"/>
-            </a:xfrm>
-            <a:prstGeom prst="line">
-              <a:avLst/>
-            </a:prstGeom>
-            <a:ln w="9525">
-              <a:solidFill>
-                <a:schemeClr val="tx1"/>
-              </a:solidFill>
-            </a:ln>
-          </p:spPr>
-          <p:style>
-            <a:lnRef idx="1">
-              <a:schemeClr val="accent1"/>
-            </a:lnRef>
-            <a:fillRef idx="0">
-              <a:schemeClr val="accent1"/>
-            </a:fillRef>
-            <a:effectRef idx="0">
-              <a:schemeClr val="accent1"/>
-            </a:effectRef>
-            <a:fontRef idx="minor">
+            </a:solidFill>
+          </a:ln>
+        </p:spPr>
+        <p:style>
+          <a:lnRef idx="1">
+            <a:schemeClr val="accent1"/>
+          </a:lnRef>
+          <a:fillRef idx="0">
+            <a:schemeClr val="accent1"/>
+          </a:fillRef>
+          <a:effectRef idx="0">
+            <a:schemeClr val="accent1"/>
+          </a:effectRef>
+          <a:fontRef idx="minor">
+            <a:schemeClr val="tx1"/>
+          </a:fontRef>
+        </p:style>
+      </p:cxnSp>
+      <p:cxnSp>
+        <p:nvCxnSpPr>
+          <p:cNvPr id="150" name="Straight Arrow Connector 149">
+            <a:extLst>
+              <a:ext uri="{FF2B5EF4-FFF2-40B4-BE49-F238E27FC236}">
+                <a16:creationId xmlns:a16="http://schemas.microsoft.com/office/drawing/2014/main" id="{4CEEC003-E039-462C-8E5B-0071A4FA2F92}"/>
+              </a:ext>
+            </a:extLst>
+          </p:cNvPr>
+          <p:cNvCxnSpPr>
+            <a:cxnSpLocks/>
+          </p:cNvCxnSpPr>
+          <p:nvPr/>
+        </p:nvCxnSpPr>
+        <p:spPr>
+          <a:xfrm flipH="1">
+            <a:off x="2675027" y="6134568"/>
+            <a:ext cx="2283" cy="329308"/>
+          </a:xfrm>
+          <a:prstGeom prst="straightConnector1">
+            <a:avLst/>
+          </a:prstGeom>
+          <a:ln w="9525">
+            <a:solidFill>
               <a:schemeClr val="tx1"/>
-            </a:fontRef>
-          </p:style>
-        </p:cxnSp>
-        <p:cxnSp>
-          <p:nvCxnSpPr>
-            <p:cNvPr id="150" name="Straight Arrow Connector 149">
-              <a:extLst>
-                <a:ext uri="{FF2B5EF4-FFF2-40B4-BE49-F238E27FC236}">
-                  <a16:creationId xmlns:a16="http://schemas.microsoft.com/office/drawing/2014/main" id="{4CEEC003-E039-462C-8E5B-0071A4FA2F92}"/>
-                </a:ext>
-              </a:extLst>
-            </p:cNvPr>
-            <p:cNvCxnSpPr>
-              <a:cxnSpLocks/>
-            </p:cNvCxnSpPr>
-            <p:nvPr/>
-          </p:nvCxnSpPr>
-          <p:spPr>
-            <a:xfrm flipH="1">
-              <a:off x="2675027" y="6064995"/>
-              <a:ext cx="2283" cy="329308"/>
-            </a:xfrm>
-            <a:prstGeom prst="straightConnector1">
-              <a:avLst/>
-            </a:prstGeom>
-            <a:ln w="9525">
-              <a:solidFill>
-                <a:schemeClr val="tx1"/>
-              </a:solidFill>
-              <a:tailEnd type="triangle"/>
-            </a:ln>
-          </p:spPr>
-          <p:style>
-            <a:lnRef idx="1">
-              <a:schemeClr val="accent1"/>
-            </a:lnRef>
-            <a:fillRef idx="0">
-              <a:schemeClr val="accent1"/>
-            </a:fillRef>
-            <a:effectRef idx="0">
-              <a:schemeClr val="accent1"/>
-            </a:effectRef>
-            <a:fontRef idx="minor">
+            </a:solidFill>
+            <a:tailEnd type="triangle"/>
+          </a:ln>
+        </p:spPr>
+        <p:style>
+          <a:lnRef idx="1">
+            <a:schemeClr val="accent1"/>
+          </a:lnRef>
+          <a:fillRef idx="0">
+            <a:schemeClr val="accent1"/>
+          </a:fillRef>
+          <a:effectRef idx="0">
+            <a:schemeClr val="accent1"/>
+          </a:effectRef>
+          <a:fontRef idx="minor">
+            <a:schemeClr val="tx1"/>
+          </a:fontRef>
+        </p:style>
+      </p:cxnSp>
+      <p:cxnSp>
+        <p:nvCxnSpPr>
+          <p:cNvPr id="155" name="Straight Arrow Connector 154">
+            <a:extLst>
+              <a:ext uri="{FF2B5EF4-FFF2-40B4-BE49-F238E27FC236}">
+                <a16:creationId xmlns:a16="http://schemas.microsoft.com/office/drawing/2014/main" id="{5CCBE1E9-71CC-46F6-87B7-E4F8AB4CD8A8}"/>
+              </a:ext>
+            </a:extLst>
+          </p:cNvPr>
+          <p:cNvCxnSpPr>
+            <a:cxnSpLocks/>
+          </p:cNvCxnSpPr>
+          <p:nvPr/>
+        </p:nvCxnSpPr>
+        <p:spPr>
+          <a:xfrm>
+            <a:off x="2999425" y="2430624"/>
+            <a:ext cx="1" cy="523281"/>
+          </a:xfrm>
+          <a:prstGeom prst="straightConnector1">
+            <a:avLst/>
+          </a:prstGeom>
+          <a:ln w="9525">
+            <a:solidFill>
               <a:schemeClr val="tx1"/>
-            </a:fontRef>
-          </p:style>
-        </p:cxnSp>
-        <p:cxnSp>
-          <p:nvCxnSpPr>
-            <p:cNvPr id="155" name="Straight Arrow Connector 154">
-              <a:extLst>
-                <a:ext uri="{FF2B5EF4-FFF2-40B4-BE49-F238E27FC236}">
-                  <a16:creationId xmlns:a16="http://schemas.microsoft.com/office/drawing/2014/main" id="{5CCBE1E9-71CC-46F6-87B7-E4F8AB4CD8A8}"/>
-                </a:ext>
-              </a:extLst>
-            </p:cNvPr>
-            <p:cNvCxnSpPr>
-              <a:cxnSpLocks/>
-            </p:cNvCxnSpPr>
-            <p:nvPr/>
-          </p:nvCxnSpPr>
-          <p:spPr>
-            <a:xfrm>
-              <a:off x="2999425" y="2430624"/>
-              <a:ext cx="1" cy="523281"/>
-            </a:xfrm>
-            <a:prstGeom prst="straightConnector1">
-              <a:avLst/>
-            </a:prstGeom>
-            <a:ln w="9525">
-              <a:solidFill>
-                <a:schemeClr val="tx1"/>
-              </a:solidFill>
-              <a:tailEnd type="triangle"/>
-            </a:ln>
-          </p:spPr>
-          <p:style>
-            <a:lnRef idx="1">
-              <a:schemeClr val="accent1"/>
-            </a:lnRef>
-            <a:fillRef idx="0">
-              <a:schemeClr val="accent1"/>
-            </a:fillRef>
-            <a:effectRef idx="0">
-              <a:schemeClr val="accent1"/>
-            </a:effectRef>
-            <a:fontRef idx="minor">
+            </a:solidFill>
+            <a:tailEnd type="triangle"/>
+          </a:ln>
+        </p:spPr>
+        <p:style>
+          <a:lnRef idx="1">
+            <a:schemeClr val="accent1"/>
+          </a:lnRef>
+          <a:fillRef idx="0">
+            <a:schemeClr val="accent1"/>
+          </a:fillRef>
+          <a:effectRef idx="0">
+            <a:schemeClr val="accent1"/>
+          </a:effectRef>
+          <a:fontRef idx="minor">
+            <a:schemeClr val="tx1"/>
+          </a:fontRef>
+        </p:style>
+      </p:cxnSp>
+      <p:cxnSp>
+        <p:nvCxnSpPr>
+          <p:cNvPr id="158" name="Straight Arrow Connector 157">
+            <a:extLst>
+              <a:ext uri="{FF2B5EF4-FFF2-40B4-BE49-F238E27FC236}">
+                <a16:creationId xmlns:a16="http://schemas.microsoft.com/office/drawing/2014/main" id="{EB3788F3-F053-4B9F-8B6F-A1E719F0C944}"/>
+              </a:ext>
+            </a:extLst>
+          </p:cNvPr>
+          <p:cNvCxnSpPr>
+            <a:cxnSpLocks/>
+          </p:cNvCxnSpPr>
+          <p:nvPr/>
+        </p:nvCxnSpPr>
+        <p:spPr>
+          <a:xfrm>
+            <a:off x="1086604" y="5096160"/>
+            <a:ext cx="2040596" cy="0"/>
+          </a:xfrm>
+          <a:prstGeom prst="straightConnector1">
+            <a:avLst/>
+          </a:prstGeom>
+          <a:ln w="9525">
+            <a:solidFill>
               <a:schemeClr val="tx1"/>
-            </a:fontRef>
-          </p:style>
-        </p:cxnSp>
-        <p:cxnSp>
-          <p:nvCxnSpPr>
-            <p:cNvPr id="158" name="Straight Arrow Connector 157">
-              <a:extLst>
-                <a:ext uri="{FF2B5EF4-FFF2-40B4-BE49-F238E27FC236}">
-                  <a16:creationId xmlns:a16="http://schemas.microsoft.com/office/drawing/2014/main" id="{EB3788F3-F053-4B9F-8B6F-A1E719F0C944}"/>
-                </a:ext>
-              </a:extLst>
-            </p:cNvPr>
-            <p:cNvCxnSpPr>
-              <a:cxnSpLocks/>
-            </p:cNvCxnSpPr>
-            <p:nvPr/>
-          </p:nvCxnSpPr>
-          <p:spPr>
-            <a:xfrm>
-              <a:off x="1086604" y="5096160"/>
-              <a:ext cx="2040596" cy="0"/>
-            </a:xfrm>
-            <a:prstGeom prst="straightConnector1">
-              <a:avLst/>
-            </a:prstGeom>
-            <a:ln w="9525">
-              <a:solidFill>
-                <a:schemeClr val="tx1"/>
-              </a:solidFill>
-              <a:tailEnd type="triangle"/>
-            </a:ln>
-          </p:spPr>
-          <p:style>
-            <a:lnRef idx="1">
-              <a:schemeClr val="accent1"/>
-            </a:lnRef>
-            <a:fillRef idx="0">
-              <a:schemeClr val="accent1"/>
-            </a:fillRef>
-            <a:effectRef idx="0">
-              <a:schemeClr val="accent1"/>
-            </a:effectRef>
-            <a:fontRef idx="minor">
+            </a:solidFill>
+            <a:tailEnd type="triangle"/>
+          </a:ln>
+        </p:spPr>
+        <p:style>
+          <a:lnRef idx="1">
+            <a:schemeClr val="accent1"/>
+          </a:lnRef>
+          <a:fillRef idx="0">
+            <a:schemeClr val="accent1"/>
+          </a:fillRef>
+          <a:effectRef idx="0">
+            <a:schemeClr val="accent1"/>
+          </a:effectRef>
+          <a:fontRef idx="minor">
+            <a:schemeClr val="tx1"/>
+          </a:fontRef>
+        </p:style>
+      </p:cxnSp>
+      <p:cxnSp>
+        <p:nvCxnSpPr>
+          <p:cNvPr id="160" name="Straight Connector 159">
+            <a:extLst>
+              <a:ext uri="{FF2B5EF4-FFF2-40B4-BE49-F238E27FC236}">
+                <a16:creationId xmlns:a16="http://schemas.microsoft.com/office/drawing/2014/main" id="{0B292357-63F9-426A-B97C-356AA694F997}"/>
+              </a:ext>
+            </a:extLst>
+          </p:cNvPr>
+          <p:cNvCxnSpPr>
+            <a:cxnSpLocks/>
+          </p:cNvCxnSpPr>
+          <p:nvPr/>
+        </p:nvCxnSpPr>
+        <p:spPr>
+          <a:xfrm flipH="1">
+            <a:off x="1087786" y="3329382"/>
+            <a:ext cx="1" cy="2308618"/>
+          </a:xfrm>
+          <a:prstGeom prst="line">
+            <a:avLst/>
+          </a:prstGeom>
+          <a:ln w="9525">
+            <a:solidFill>
               <a:schemeClr val="tx1"/>
-            </a:fontRef>
-          </p:style>
-        </p:cxnSp>
-        <p:cxnSp>
-          <p:nvCxnSpPr>
-            <p:cNvPr id="160" name="Straight Connector 159">
-              <a:extLst>
-                <a:ext uri="{FF2B5EF4-FFF2-40B4-BE49-F238E27FC236}">
-                  <a16:creationId xmlns:a16="http://schemas.microsoft.com/office/drawing/2014/main" id="{0B292357-63F9-426A-B97C-356AA694F997}"/>
-                </a:ext>
-              </a:extLst>
-            </p:cNvPr>
-            <p:cNvCxnSpPr>
-              <a:cxnSpLocks/>
-            </p:cNvCxnSpPr>
-            <p:nvPr/>
-          </p:nvCxnSpPr>
-          <p:spPr>
-            <a:xfrm flipH="1">
-              <a:off x="1087786" y="3329382"/>
-              <a:ext cx="1" cy="2308618"/>
-            </a:xfrm>
-            <a:prstGeom prst="line">
-              <a:avLst/>
-            </a:prstGeom>
-            <a:ln w="9525">
-              <a:solidFill>
-                <a:schemeClr val="tx1"/>
-              </a:solidFill>
-            </a:ln>
-          </p:spPr>
-          <p:style>
-            <a:lnRef idx="1">
-              <a:schemeClr val="accent1"/>
-            </a:lnRef>
-            <a:fillRef idx="0">
-              <a:schemeClr val="accent1"/>
-            </a:fillRef>
-            <a:effectRef idx="0">
-              <a:schemeClr val="accent1"/>
-            </a:effectRef>
-            <a:fontRef idx="minor">
+            </a:solidFill>
+          </a:ln>
+        </p:spPr>
+        <p:style>
+          <a:lnRef idx="1">
+            <a:schemeClr val="accent1"/>
+          </a:lnRef>
+          <a:fillRef idx="0">
+            <a:schemeClr val="accent1"/>
+          </a:fillRef>
+          <a:effectRef idx="0">
+            <a:schemeClr val="accent1"/>
+          </a:effectRef>
+          <a:fontRef idx="minor">
+            <a:schemeClr val="tx1"/>
+          </a:fontRef>
+        </p:style>
+      </p:cxnSp>
+      <p:cxnSp>
+        <p:nvCxnSpPr>
+          <p:cNvPr id="162" name="Straight Arrow Connector 161">
+            <a:extLst>
+              <a:ext uri="{FF2B5EF4-FFF2-40B4-BE49-F238E27FC236}">
+                <a16:creationId xmlns:a16="http://schemas.microsoft.com/office/drawing/2014/main" id="{3453C37C-FAEF-496A-9FB5-7A20970CEADF}"/>
+              </a:ext>
+            </a:extLst>
+          </p:cNvPr>
+          <p:cNvCxnSpPr>
+            <a:cxnSpLocks/>
+          </p:cNvCxnSpPr>
+          <p:nvPr/>
+        </p:nvCxnSpPr>
+        <p:spPr>
+          <a:xfrm>
+            <a:off x="4536773" y="2202490"/>
+            <a:ext cx="0" cy="2625769"/>
+          </a:xfrm>
+          <a:prstGeom prst="straightConnector1">
+            <a:avLst/>
+          </a:prstGeom>
+          <a:ln w="9525">
+            <a:solidFill>
               <a:schemeClr val="tx1"/>
-            </a:fontRef>
-          </p:style>
-        </p:cxnSp>
-        <p:cxnSp>
-          <p:nvCxnSpPr>
-            <p:cNvPr id="162" name="Straight Arrow Connector 161">
-              <a:extLst>
-                <a:ext uri="{FF2B5EF4-FFF2-40B4-BE49-F238E27FC236}">
-                  <a16:creationId xmlns:a16="http://schemas.microsoft.com/office/drawing/2014/main" id="{3453C37C-FAEF-496A-9FB5-7A20970CEADF}"/>
-                </a:ext>
-              </a:extLst>
-            </p:cNvPr>
-            <p:cNvCxnSpPr>
-              <a:cxnSpLocks/>
-            </p:cNvCxnSpPr>
-            <p:nvPr/>
-          </p:nvCxnSpPr>
-          <p:spPr>
-            <a:xfrm>
-              <a:off x="4536773" y="2202490"/>
-              <a:ext cx="0" cy="2625769"/>
-            </a:xfrm>
-            <a:prstGeom prst="straightConnector1">
-              <a:avLst/>
-            </a:prstGeom>
-            <a:ln w="9525">
-              <a:solidFill>
-                <a:schemeClr val="tx1"/>
-              </a:solidFill>
-              <a:tailEnd type="triangle"/>
-            </a:ln>
-          </p:spPr>
-          <p:style>
-            <a:lnRef idx="1">
-              <a:schemeClr val="accent1"/>
-            </a:lnRef>
-            <a:fillRef idx="0">
-              <a:schemeClr val="accent1"/>
-            </a:fillRef>
-            <a:effectRef idx="0">
-              <a:schemeClr val="accent1"/>
-            </a:effectRef>
-            <a:fontRef idx="minor">
+            </a:solidFill>
+            <a:tailEnd type="triangle"/>
+          </a:ln>
+        </p:spPr>
+        <p:style>
+          <a:lnRef idx="1">
+            <a:schemeClr val="accent1"/>
+          </a:lnRef>
+          <a:fillRef idx="0">
+            <a:schemeClr val="accent1"/>
+          </a:fillRef>
+          <a:effectRef idx="0">
+            <a:schemeClr val="accent1"/>
+          </a:effectRef>
+          <a:fontRef idx="minor">
+            <a:schemeClr val="tx1"/>
+          </a:fontRef>
+        </p:style>
+      </p:cxnSp>
+      <p:cxnSp>
+        <p:nvCxnSpPr>
+          <p:cNvPr id="165" name="Straight Arrow Connector 164">
+            <a:extLst>
+              <a:ext uri="{FF2B5EF4-FFF2-40B4-BE49-F238E27FC236}">
+                <a16:creationId xmlns:a16="http://schemas.microsoft.com/office/drawing/2014/main" id="{EDE542EA-DBC5-44EA-9B66-C4AA3B7E3459}"/>
+              </a:ext>
+            </a:extLst>
+          </p:cNvPr>
+          <p:cNvCxnSpPr>
+            <a:cxnSpLocks/>
+          </p:cNvCxnSpPr>
+          <p:nvPr/>
+        </p:nvCxnSpPr>
+        <p:spPr>
+          <a:xfrm flipH="1">
+            <a:off x="3023777" y="3933231"/>
+            <a:ext cx="1186765" cy="0"/>
+          </a:xfrm>
+          <a:prstGeom prst="straightConnector1">
+            <a:avLst/>
+          </a:prstGeom>
+          <a:ln w="9525">
+            <a:solidFill>
               <a:schemeClr val="tx1"/>
-            </a:fontRef>
-          </p:style>
-        </p:cxnSp>
-        <p:cxnSp>
-          <p:nvCxnSpPr>
-            <p:cNvPr id="165" name="Straight Arrow Connector 164">
-              <a:extLst>
-                <a:ext uri="{FF2B5EF4-FFF2-40B4-BE49-F238E27FC236}">
-                  <a16:creationId xmlns:a16="http://schemas.microsoft.com/office/drawing/2014/main" id="{EDE542EA-DBC5-44EA-9B66-C4AA3B7E3459}"/>
-                </a:ext>
-              </a:extLst>
-            </p:cNvPr>
-            <p:cNvCxnSpPr>
-              <a:cxnSpLocks/>
-            </p:cNvCxnSpPr>
-            <p:nvPr/>
-          </p:nvCxnSpPr>
-          <p:spPr>
-            <a:xfrm flipH="1">
-              <a:off x="3023777" y="3933231"/>
-              <a:ext cx="1186765" cy="0"/>
-            </a:xfrm>
-            <a:prstGeom prst="straightConnector1">
-              <a:avLst/>
-            </a:prstGeom>
-            <a:ln w="9525">
-              <a:solidFill>
-                <a:schemeClr val="tx1"/>
-              </a:solidFill>
-              <a:tailEnd type="triangle"/>
-            </a:ln>
-          </p:spPr>
-          <p:style>
-            <a:lnRef idx="1">
-              <a:schemeClr val="accent1"/>
-            </a:lnRef>
-            <a:fillRef idx="0">
-              <a:schemeClr val="accent1"/>
-            </a:fillRef>
-            <a:effectRef idx="0">
-              <a:schemeClr val="accent1"/>
-            </a:effectRef>
-            <a:fontRef idx="minor">
+            </a:solidFill>
+            <a:tailEnd type="triangle"/>
+          </a:ln>
+        </p:spPr>
+        <p:style>
+          <a:lnRef idx="1">
+            <a:schemeClr val="accent1"/>
+          </a:lnRef>
+          <a:fillRef idx="0">
+            <a:schemeClr val="accent1"/>
+          </a:fillRef>
+          <a:effectRef idx="0">
+            <a:schemeClr val="accent1"/>
+          </a:effectRef>
+          <a:fontRef idx="minor">
+            <a:schemeClr val="tx1"/>
+          </a:fontRef>
+        </p:style>
+      </p:cxnSp>
+      <p:cxnSp>
+        <p:nvCxnSpPr>
+          <p:cNvPr id="166" name="Straight Connector 165">
+            <a:extLst>
+              <a:ext uri="{FF2B5EF4-FFF2-40B4-BE49-F238E27FC236}">
+                <a16:creationId xmlns:a16="http://schemas.microsoft.com/office/drawing/2014/main" id="{BF35F3B7-BA5F-4740-B113-7D5F0023435C}"/>
+              </a:ext>
+            </a:extLst>
+          </p:cNvPr>
+          <p:cNvCxnSpPr/>
+          <p:nvPr/>
+        </p:nvCxnSpPr>
+        <p:spPr>
+          <a:xfrm flipH="1">
+            <a:off x="4215347" y="2202109"/>
+            <a:ext cx="1" cy="1734499"/>
+          </a:xfrm>
+          <a:prstGeom prst="line">
+            <a:avLst/>
+          </a:prstGeom>
+          <a:ln w="9525">
+            <a:solidFill>
               <a:schemeClr val="tx1"/>
-            </a:fontRef>
-          </p:style>
-        </p:cxnSp>
-        <p:cxnSp>
-          <p:nvCxnSpPr>
-            <p:cNvPr id="166" name="Straight Connector 165">
-              <a:extLst>
-                <a:ext uri="{FF2B5EF4-FFF2-40B4-BE49-F238E27FC236}">
-                  <a16:creationId xmlns:a16="http://schemas.microsoft.com/office/drawing/2014/main" id="{BF35F3B7-BA5F-4740-B113-7D5F0023435C}"/>
-                </a:ext>
-              </a:extLst>
-            </p:cNvPr>
-            <p:cNvCxnSpPr/>
-            <p:nvPr/>
-          </p:nvCxnSpPr>
-          <p:spPr>
-            <a:xfrm flipH="1">
-              <a:off x="4215347" y="2202109"/>
-              <a:ext cx="1" cy="1734499"/>
-            </a:xfrm>
-            <a:prstGeom prst="line">
-              <a:avLst/>
-            </a:prstGeom>
-            <a:ln w="9525">
-              <a:solidFill>
-                <a:schemeClr val="tx1"/>
-              </a:solidFill>
-            </a:ln>
-          </p:spPr>
-          <p:style>
-            <a:lnRef idx="1">
-              <a:schemeClr val="accent1"/>
-            </a:lnRef>
-            <a:fillRef idx="0">
-              <a:schemeClr val="accent1"/>
-            </a:fillRef>
-            <a:effectRef idx="0">
-              <a:schemeClr val="accent1"/>
-            </a:effectRef>
-            <a:fontRef idx="minor">
+            </a:solidFill>
+          </a:ln>
+        </p:spPr>
+        <p:style>
+          <a:lnRef idx="1">
+            <a:schemeClr val="accent1"/>
+          </a:lnRef>
+          <a:fillRef idx="0">
+            <a:schemeClr val="accent1"/>
+          </a:fillRef>
+          <a:effectRef idx="0">
+            <a:schemeClr val="accent1"/>
+          </a:effectRef>
+          <a:fontRef idx="minor">
+            <a:schemeClr val="tx1"/>
+          </a:fontRef>
+        </p:style>
+      </p:cxnSp>
+      <p:cxnSp>
+        <p:nvCxnSpPr>
+          <p:cNvPr id="169" name="Straight Arrow Connector 168">
+            <a:extLst>
+              <a:ext uri="{FF2B5EF4-FFF2-40B4-BE49-F238E27FC236}">
+                <a16:creationId xmlns:a16="http://schemas.microsoft.com/office/drawing/2014/main" id="{534B27D9-05C4-48B9-9B7D-F4CE4CE51C80}"/>
+              </a:ext>
+            </a:extLst>
+          </p:cNvPr>
+          <p:cNvCxnSpPr>
+            <a:cxnSpLocks/>
+          </p:cNvCxnSpPr>
+          <p:nvPr/>
+        </p:nvCxnSpPr>
+        <p:spPr>
+          <a:xfrm flipH="1">
+            <a:off x="3067540" y="6748733"/>
+            <a:ext cx="1078877" cy="0"/>
+          </a:xfrm>
+          <a:prstGeom prst="straightConnector1">
+            <a:avLst/>
+          </a:prstGeom>
+          <a:ln w="9525">
+            <a:solidFill>
               <a:schemeClr val="tx1"/>
-            </a:fontRef>
-          </p:style>
-        </p:cxnSp>
-        <p:cxnSp>
-          <p:nvCxnSpPr>
-            <p:cNvPr id="169" name="Straight Arrow Connector 168">
-              <a:extLst>
-                <a:ext uri="{FF2B5EF4-FFF2-40B4-BE49-F238E27FC236}">
-                  <a16:creationId xmlns:a16="http://schemas.microsoft.com/office/drawing/2014/main" id="{534B27D9-05C4-48B9-9B7D-F4CE4CE51C80}"/>
-                </a:ext>
-              </a:extLst>
-            </p:cNvPr>
-            <p:cNvCxnSpPr>
-              <a:cxnSpLocks/>
-            </p:cNvCxnSpPr>
-            <p:nvPr/>
-          </p:nvCxnSpPr>
-          <p:spPr>
-            <a:xfrm flipH="1">
-              <a:off x="3067540" y="6748733"/>
-              <a:ext cx="1078877" cy="0"/>
-            </a:xfrm>
-            <a:prstGeom prst="straightConnector1">
-              <a:avLst/>
-            </a:prstGeom>
-            <a:ln w="9525">
-              <a:solidFill>
-                <a:schemeClr val="tx1"/>
-              </a:solidFill>
-              <a:tailEnd type="triangle"/>
-            </a:ln>
-          </p:spPr>
-          <p:style>
-            <a:lnRef idx="1">
-              <a:schemeClr val="accent1"/>
-            </a:lnRef>
-            <a:fillRef idx="0">
-              <a:schemeClr val="accent1"/>
-            </a:fillRef>
-            <a:effectRef idx="0">
-              <a:schemeClr val="accent1"/>
-            </a:effectRef>
-            <a:fontRef idx="minor">
+            </a:solidFill>
+            <a:tailEnd type="triangle"/>
+          </a:ln>
+        </p:spPr>
+        <p:style>
+          <a:lnRef idx="1">
+            <a:schemeClr val="accent1"/>
+          </a:lnRef>
+          <a:fillRef idx="0">
+            <a:schemeClr val="accent1"/>
+          </a:fillRef>
+          <a:effectRef idx="0">
+            <a:schemeClr val="accent1"/>
+          </a:effectRef>
+          <a:fontRef idx="minor">
+            <a:schemeClr val="tx1"/>
+          </a:fontRef>
+        </p:style>
+      </p:cxnSp>
+      <p:sp>
+        <p:nvSpPr>
+          <p:cNvPr id="170" name="TextBox 169">
+            <a:extLst>
+              <a:ext uri="{FF2B5EF4-FFF2-40B4-BE49-F238E27FC236}">
+                <a16:creationId xmlns:a16="http://schemas.microsoft.com/office/drawing/2014/main" id="{68630CDA-D7CB-4F71-94FA-BDABED5E88FE}"/>
+              </a:ext>
+            </a:extLst>
+          </p:cNvPr>
+          <p:cNvSpPr txBox="1"/>
+          <p:nvPr/>
+        </p:nvSpPr>
+        <p:spPr>
+          <a:xfrm>
+            <a:off x="1593368" y="5491347"/>
+            <a:ext cx="2155146" cy="400110"/>
+          </a:xfrm>
+          <a:prstGeom prst="rect">
+            <a:avLst/>
+          </a:prstGeom>
+          <a:solidFill>
+            <a:schemeClr val="bg2"/>
+          </a:solidFill>
+          <a:ln w="9525">
+            <a:solidFill>
               <a:schemeClr val="tx1"/>
-            </a:fontRef>
-          </p:style>
-        </p:cxnSp>
-        <p:sp>
-          <p:nvSpPr>
-            <p:cNvPr id="170" name="TextBox 169">
-              <a:extLst>
-                <a:ext uri="{FF2B5EF4-FFF2-40B4-BE49-F238E27FC236}">
-                  <a16:creationId xmlns:a16="http://schemas.microsoft.com/office/drawing/2014/main" id="{68630CDA-D7CB-4F71-94FA-BDABED5E88FE}"/>
-                </a:ext>
-              </a:extLst>
-            </p:cNvPr>
-            <p:cNvSpPr txBox="1"/>
-            <p:nvPr/>
-          </p:nvSpPr>
-          <p:spPr>
-            <a:xfrm>
-              <a:off x="1593368" y="5491347"/>
-              <a:ext cx="2155146" cy="246221"/>
-            </a:xfrm>
-            <a:prstGeom prst="rect">
-              <a:avLst/>
-            </a:prstGeom>
+            </a:solidFill>
+          </a:ln>
+        </p:spPr>
+        <p:txBody>
+          <a:bodyPr wrap="square" rtlCol="0">
+            <a:spAutoFit/>
+          </a:bodyPr>
+          <a:lstStyle/>
+          <a:p>
+            <a:pPr algn="ctr"/>
+            <a:r>
+              <a:rPr lang="en-US" sz="1000" dirty="0" smtClean="0"/>
+              <a:t>(1) Soil structure/pore size distributions</a:t>
+            </a:r>
+            <a:endParaRPr lang="en-US" sz="1000" dirty="0"/>
+          </a:p>
+        </p:txBody>
+      </p:sp>
+      <p:cxnSp>
+        <p:nvCxnSpPr>
+          <p:cNvPr id="171" name="Straight Arrow Connector 170">
+            <a:extLst>
+              <a:ext uri="{FF2B5EF4-FFF2-40B4-BE49-F238E27FC236}">
+                <a16:creationId xmlns:a16="http://schemas.microsoft.com/office/drawing/2014/main" id="{663EA009-7A37-4BE8-9A68-3DB9D98D41CC}"/>
+              </a:ext>
+            </a:extLst>
+          </p:cNvPr>
+          <p:cNvCxnSpPr>
+            <a:cxnSpLocks/>
+          </p:cNvCxnSpPr>
+          <p:nvPr/>
+        </p:nvCxnSpPr>
+        <p:spPr>
+          <a:xfrm flipH="1">
+            <a:off x="2673586" y="5865391"/>
+            <a:ext cx="2283" cy="204475"/>
+          </a:xfrm>
+          <a:prstGeom prst="straightConnector1">
+            <a:avLst/>
+          </a:prstGeom>
+          <a:ln w="9525">
             <a:solidFill>
-              <a:schemeClr val="accent2"/>
+              <a:schemeClr val="tx1"/>
             </a:solidFill>
-            <a:ln w="9525">
-              <a:solidFill>
-                <a:schemeClr val="tx1"/>
-              </a:solidFill>
-            </a:ln>
-          </p:spPr>
-          <p:txBody>
-            <a:bodyPr wrap="square" rtlCol="0">
-              <a:spAutoFit/>
-            </a:bodyPr>
-            <a:lstStyle/>
-            <a:p>
-              <a:pPr algn="ctr"/>
-              <a:r>
-                <a:rPr lang="en-US" sz="1000" dirty="0"/>
-                <a:t>Soil structure</a:t>
-              </a:r>
-            </a:p>
-          </p:txBody>
-        </p:sp>
-        <p:cxnSp>
-          <p:nvCxnSpPr>
-            <p:cNvPr id="171" name="Straight Arrow Connector 170">
-              <a:extLst>
-                <a:ext uri="{FF2B5EF4-FFF2-40B4-BE49-F238E27FC236}">
-                  <a16:creationId xmlns:a16="http://schemas.microsoft.com/office/drawing/2014/main" id="{663EA009-7A37-4BE8-9A68-3DB9D98D41CC}"/>
-                </a:ext>
-              </a:extLst>
-            </p:cNvPr>
-            <p:cNvCxnSpPr>
-              <a:cxnSpLocks/>
-            </p:cNvCxnSpPr>
-            <p:nvPr/>
-          </p:nvCxnSpPr>
-          <p:spPr>
-            <a:xfrm flipH="1">
-              <a:off x="2673586" y="5716306"/>
-              <a:ext cx="2283" cy="204475"/>
-            </a:xfrm>
-            <a:prstGeom prst="straightConnector1">
-              <a:avLst/>
-            </a:prstGeom>
-            <a:ln w="9525">
-              <a:solidFill>
-                <a:schemeClr val="tx1"/>
-              </a:solidFill>
-              <a:tailEnd type="triangle"/>
-            </a:ln>
-          </p:spPr>
-          <p:style>
-            <a:lnRef idx="1">
-              <a:schemeClr val="accent1"/>
-            </a:lnRef>
-            <a:fillRef idx="0">
-              <a:schemeClr val="accent1"/>
-            </a:fillRef>
-            <a:effectRef idx="0">
-              <a:schemeClr val="accent1"/>
-            </a:effectRef>
-            <a:fontRef idx="minor">
+            <a:tailEnd type="triangle"/>
+          </a:ln>
+        </p:spPr>
+        <p:style>
+          <a:lnRef idx="1">
+            <a:schemeClr val="accent1"/>
+          </a:lnRef>
+          <a:fillRef idx="0">
+            <a:schemeClr val="accent1"/>
+          </a:fillRef>
+          <a:effectRef idx="0">
+            <a:schemeClr val="accent1"/>
+          </a:effectRef>
+          <a:fontRef idx="minor">
+            <a:schemeClr val="tx1"/>
+          </a:fontRef>
+        </p:style>
+      </p:cxnSp>
+      <p:cxnSp>
+        <p:nvCxnSpPr>
+          <p:cNvPr id="175" name="Straight Arrow Connector 174">
+            <a:extLst>
+              <a:ext uri="{FF2B5EF4-FFF2-40B4-BE49-F238E27FC236}">
+                <a16:creationId xmlns:a16="http://schemas.microsoft.com/office/drawing/2014/main" id="{AF84A429-61E5-4732-A27D-DEAC4CF53B42}"/>
+              </a:ext>
+            </a:extLst>
+          </p:cNvPr>
+          <p:cNvCxnSpPr>
+            <a:cxnSpLocks/>
+          </p:cNvCxnSpPr>
+          <p:nvPr/>
+        </p:nvCxnSpPr>
+        <p:spPr>
+          <a:xfrm>
+            <a:off x="1084919" y="5634335"/>
+            <a:ext cx="503304" cy="0"/>
+          </a:xfrm>
+          <a:prstGeom prst="straightConnector1">
+            <a:avLst/>
+          </a:prstGeom>
+          <a:ln w="9525">
+            <a:solidFill>
               <a:schemeClr val="tx1"/>
-            </a:fontRef>
-          </p:style>
-        </p:cxnSp>
-        <p:cxnSp>
-          <p:nvCxnSpPr>
-            <p:cNvPr id="175" name="Straight Arrow Connector 174">
-              <a:extLst>
-                <a:ext uri="{FF2B5EF4-FFF2-40B4-BE49-F238E27FC236}">
-                  <a16:creationId xmlns:a16="http://schemas.microsoft.com/office/drawing/2014/main" id="{AF84A429-61E5-4732-A27D-DEAC4CF53B42}"/>
-                </a:ext>
-              </a:extLst>
-            </p:cNvPr>
-            <p:cNvCxnSpPr>
-              <a:cxnSpLocks/>
-            </p:cNvCxnSpPr>
-            <p:nvPr/>
-          </p:nvCxnSpPr>
-          <p:spPr>
-            <a:xfrm>
-              <a:off x="1087919" y="5614457"/>
-              <a:ext cx="457549" cy="0"/>
-            </a:xfrm>
-            <a:prstGeom prst="straightConnector1">
-              <a:avLst/>
-            </a:prstGeom>
-            <a:ln w="9525">
-              <a:solidFill>
-                <a:schemeClr val="tx1"/>
-              </a:solidFill>
-              <a:tailEnd type="triangle"/>
-            </a:ln>
-          </p:spPr>
-          <p:style>
-            <a:lnRef idx="1">
-              <a:schemeClr val="accent1"/>
-            </a:lnRef>
-            <a:fillRef idx="0">
-              <a:schemeClr val="accent1"/>
-            </a:fillRef>
-            <a:effectRef idx="0">
-              <a:schemeClr val="accent1"/>
-            </a:effectRef>
-            <a:fontRef idx="minor">
+            </a:solidFill>
+            <a:tailEnd type="triangle"/>
+          </a:ln>
+        </p:spPr>
+        <p:style>
+          <a:lnRef idx="1">
+            <a:schemeClr val="accent1"/>
+          </a:lnRef>
+          <a:fillRef idx="0">
+            <a:schemeClr val="accent1"/>
+          </a:fillRef>
+          <a:effectRef idx="0">
+            <a:schemeClr val="accent1"/>
+          </a:effectRef>
+          <a:fontRef idx="minor">
+            <a:schemeClr val="tx1"/>
+          </a:fontRef>
+        </p:style>
+      </p:cxnSp>
+      <p:sp>
+        <p:nvSpPr>
+          <p:cNvPr id="6" name="TextBox 5">
+            <a:extLst>
+              <a:ext uri="{FF2B5EF4-FFF2-40B4-BE49-F238E27FC236}">
+                <a16:creationId xmlns:a16="http://schemas.microsoft.com/office/drawing/2014/main" id="{21876E51-290C-4303-A6AD-0D8D552ADC8C}"/>
+              </a:ext>
+            </a:extLst>
+          </p:cNvPr>
+          <p:cNvSpPr txBox="1"/>
+          <p:nvPr/>
+        </p:nvSpPr>
+        <p:spPr>
+          <a:xfrm>
+            <a:off x="2879774" y="1970332"/>
+            <a:ext cx="750407" cy="553998"/>
+          </a:xfrm>
+          <a:prstGeom prst="rect">
+            <a:avLst/>
+          </a:prstGeom>
+          <a:solidFill>
+            <a:schemeClr val="accent2"/>
+          </a:solidFill>
+          <a:ln w="9525">
+            <a:solidFill>
               <a:schemeClr val="tx1"/>
-            </a:fontRef>
-          </p:style>
-        </p:cxnSp>
-        <p:sp>
-          <p:nvSpPr>
-            <p:cNvPr id="6" name="TextBox 5">
-              <a:extLst>
-                <a:ext uri="{FF2B5EF4-FFF2-40B4-BE49-F238E27FC236}">
-                  <a16:creationId xmlns:a16="http://schemas.microsoft.com/office/drawing/2014/main" id="{21876E51-290C-4303-A6AD-0D8D552ADC8C}"/>
-                </a:ext>
-              </a:extLst>
-            </p:cNvPr>
-            <p:cNvSpPr txBox="1"/>
-            <p:nvPr/>
-          </p:nvSpPr>
-          <p:spPr>
-            <a:xfrm>
-              <a:off x="2879774" y="1970332"/>
-              <a:ext cx="750407" cy="553998"/>
-            </a:xfrm>
-            <a:prstGeom prst="rect">
-              <a:avLst/>
-            </a:prstGeom>
+            </a:solidFill>
+          </a:ln>
+        </p:spPr>
+        <p:txBody>
+          <a:bodyPr wrap="square" rtlCol="0">
+            <a:spAutoFit/>
+          </a:bodyPr>
+          <a:lstStyle/>
+          <a:p>
+            <a:pPr algn="ctr"/>
+            <a:r>
+              <a:rPr lang="en-US" sz="1000" dirty="0"/>
+              <a:t>Below-ground biomass</a:t>
+            </a:r>
+          </a:p>
+        </p:txBody>
+      </p:sp>
+      <p:sp>
+        <p:nvSpPr>
+          <p:cNvPr id="77" name="TextBox 76">
+            <a:extLst>
+              <a:ext uri="{FF2B5EF4-FFF2-40B4-BE49-F238E27FC236}">
+                <a16:creationId xmlns:a16="http://schemas.microsoft.com/office/drawing/2014/main" id="{592AC19D-B477-462D-A16C-DFA019277B56}"/>
+              </a:ext>
+            </a:extLst>
+          </p:cNvPr>
+          <p:cNvSpPr txBox="1"/>
+          <p:nvPr/>
+        </p:nvSpPr>
+        <p:spPr>
+          <a:xfrm>
+            <a:off x="1307054" y="3895619"/>
+            <a:ext cx="709201" cy="553998"/>
+          </a:xfrm>
+          <a:prstGeom prst="rect">
+            <a:avLst/>
+          </a:prstGeom>
+          <a:solidFill>
+            <a:schemeClr val="accent2"/>
+          </a:solidFill>
+          <a:ln w="9525">
             <a:solidFill>
-              <a:schemeClr val="accent2"/>
+              <a:schemeClr val="tx1"/>
             </a:solidFill>
-            <a:ln w="9525">
-              <a:solidFill>
-                <a:schemeClr val="tx1"/>
-              </a:solidFill>
-            </a:ln>
-          </p:spPr>
-          <p:txBody>
-            <a:bodyPr wrap="square" rtlCol="0">
-              <a:spAutoFit/>
-            </a:bodyPr>
-            <a:lstStyle/>
-            <a:p>
-              <a:pPr algn="ctr"/>
-              <a:r>
-                <a:rPr lang="en-US" sz="1000" dirty="0"/>
-                <a:t>Below-ground biomass</a:t>
-              </a:r>
-            </a:p>
-          </p:txBody>
-        </p:sp>
-        <p:sp>
-          <p:nvSpPr>
-            <p:cNvPr id="77" name="TextBox 76">
-              <a:extLst>
-                <a:ext uri="{FF2B5EF4-FFF2-40B4-BE49-F238E27FC236}">
-                  <a16:creationId xmlns:a16="http://schemas.microsoft.com/office/drawing/2014/main" id="{592AC19D-B477-462D-A16C-DFA019277B56}"/>
-                </a:ext>
-              </a:extLst>
-            </p:cNvPr>
-            <p:cNvSpPr txBox="1"/>
-            <p:nvPr/>
-          </p:nvSpPr>
-          <p:spPr>
-            <a:xfrm>
-              <a:off x="1307054" y="3895619"/>
-              <a:ext cx="709201" cy="553998"/>
-            </a:xfrm>
-            <a:prstGeom prst="rect">
-              <a:avLst/>
-            </a:prstGeom>
+          </a:ln>
+        </p:spPr>
+        <p:txBody>
+          <a:bodyPr wrap="square" rtlCol="0">
+            <a:spAutoFit/>
+          </a:bodyPr>
+          <a:lstStyle/>
+          <a:p>
+            <a:pPr algn="ctr"/>
+            <a:r>
+              <a:rPr lang="en-US" sz="1000" dirty="0"/>
+              <a:t>Soil Organic Matter</a:t>
+            </a:r>
+          </a:p>
+        </p:txBody>
+      </p:sp>
+      <p:sp>
+        <p:nvSpPr>
+          <p:cNvPr id="40" name="TextBox 39">
+            <a:extLst>
+              <a:ext uri="{FF2B5EF4-FFF2-40B4-BE49-F238E27FC236}">
+                <a16:creationId xmlns:a16="http://schemas.microsoft.com/office/drawing/2014/main" id="{D29EBCB2-DAFE-4E53-9427-A32478F274C9}"/>
+              </a:ext>
+            </a:extLst>
+          </p:cNvPr>
+          <p:cNvSpPr txBox="1"/>
+          <p:nvPr/>
+        </p:nvSpPr>
+        <p:spPr>
+          <a:xfrm>
+            <a:off x="733186" y="2952172"/>
+            <a:ext cx="709201" cy="400110"/>
+          </a:xfrm>
+          <a:prstGeom prst="rect">
+            <a:avLst/>
+          </a:prstGeom>
+          <a:solidFill>
+            <a:schemeClr val="accent2"/>
+          </a:solidFill>
+          <a:ln w="9525">
             <a:solidFill>
-              <a:schemeClr val="accent2"/>
+              <a:schemeClr val="tx1"/>
             </a:solidFill>
-            <a:ln w="9525">
-              <a:solidFill>
-                <a:schemeClr val="tx1"/>
-              </a:solidFill>
-            </a:ln>
-          </p:spPr>
-          <p:txBody>
-            <a:bodyPr wrap="square" rtlCol="0">
-              <a:spAutoFit/>
-            </a:bodyPr>
-            <a:lstStyle/>
-            <a:p>
-              <a:pPr algn="ctr"/>
-              <a:r>
-                <a:rPr lang="en-US" sz="1000" dirty="0"/>
-                <a:t>Soil Organic Matter</a:t>
-              </a:r>
-            </a:p>
-          </p:txBody>
-        </p:sp>
-        <p:sp>
-          <p:nvSpPr>
-            <p:cNvPr id="40" name="TextBox 39">
-              <a:extLst>
-                <a:ext uri="{FF2B5EF4-FFF2-40B4-BE49-F238E27FC236}">
-                  <a16:creationId xmlns:a16="http://schemas.microsoft.com/office/drawing/2014/main" id="{D29EBCB2-DAFE-4E53-9427-A32478F274C9}"/>
-                </a:ext>
-              </a:extLst>
-            </p:cNvPr>
-            <p:cNvSpPr txBox="1"/>
-            <p:nvPr/>
-          </p:nvSpPr>
-          <p:spPr>
-            <a:xfrm>
-              <a:off x="733186" y="2952172"/>
-              <a:ext cx="709201" cy="400110"/>
-            </a:xfrm>
-            <a:prstGeom prst="rect">
-              <a:avLst/>
-            </a:prstGeom>
+          </a:ln>
+        </p:spPr>
+        <p:txBody>
+          <a:bodyPr wrap="square" rtlCol="0">
+            <a:spAutoFit/>
+          </a:bodyPr>
+          <a:lstStyle/>
+          <a:p>
+            <a:pPr algn="ctr"/>
+            <a:r>
+              <a:rPr lang="en-US" sz="1000" dirty="0"/>
+              <a:t>Soil Erosion</a:t>
+            </a:r>
+          </a:p>
+        </p:txBody>
+      </p:sp>
+      <p:sp>
+        <p:nvSpPr>
+          <p:cNvPr id="86" name="TextBox 85">
+            <a:extLst>
+              <a:ext uri="{FF2B5EF4-FFF2-40B4-BE49-F238E27FC236}">
+                <a16:creationId xmlns:a16="http://schemas.microsoft.com/office/drawing/2014/main" id="{8FF35A50-2D70-45A5-97C0-09FA7E9396C3}"/>
+              </a:ext>
+            </a:extLst>
+          </p:cNvPr>
+          <p:cNvSpPr txBox="1"/>
+          <p:nvPr/>
+        </p:nvSpPr>
+        <p:spPr>
+          <a:xfrm>
+            <a:off x="3143563" y="4878132"/>
+            <a:ext cx="1614352" cy="400110"/>
+          </a:xfrm>
+          <a:prstGeom prst="rect">
+            <a:avLst/>
+          </a:prstGeom>
+          <a:solidFill>
+            <a:schemeClr val="accent2"/>
+          </a:solidFill>
+          <a:ln w="9525">
             <a:solidFill>
-              <a:schemeClr val="accent2"/>
+              <a:schemeClr val="tx1"/>
             </a:solidFill>
-            <a:ln w="9525">
-              <a:solidFill>
-                <a:schemeClr val="tx1"/>
-              </a:solidFill>
-            </a:ln>
-          </p:spPr>
-          <p:txBody>
-            <a:bodyPr wrap="square" rtlCol="0">
-              <a:spAutoFit/>
-            </a:bodyPr>
-            <a:lstStyle/>
-            <a:p>
-              <a:pPr algn="ctr"/>
-              <a:r>
-                <a:rPr lang="en-US" sz="1000" dirty="0"/>
-                <a:t>Soil Erosion</a:t>
-              </a:r>
-            </a:p>
-          </p:txBody>
-        </p:sp>
-        <p:sp>
-          <p:nvSpPr>
-            <p:cNvPr id="86" name="TextBox 85">
-              <a:extLst>
-                <a:ext uri="{FF2B5EF4-FFF2-40B4-BE49-F238E27FC236}">
-                  <a16:creationId xmlns:a16="http://schemas.microsoft.com/office/drawing/2014/main" id="{8FF35A50-2D70-45A5-97C0-09FA7E9396C3}"/>
-                </a:ext>
-              </a:extLst>
-            </p:cNvPr>
-            <p:cNvSpPr txBox="1"/>
-            <p:nvPr/>
-          </p:nvSpPr>
-          <p:spPr>
-            <a:xfrm>
-              <a:off x="3143563" y="4878132"/>
-              <a:ext cx="1614352" cy="400110"/>
-            </a:xfrm>
-            <a:prstGeom prst="rect">
-              <a:avLst/>
-            </a:prstGeom>
+          </a:ln>
+        </p:spPr>
+        <p:txBody>
+          <a:bodyPr wrap="square" rtlCol="0">
+            <a:spAutoFit/>
+          </a:bodyPr>
+          <a:lstStyle/>
+          <a:p>
+            <a:pPr algn="ctr"/>
+            <a:r>
+              <a:rPr lang="en-US" sz="1000" dirty="0"/>
+              <a:t>Soil porosity</a:t>
+            </a:r>
+          </a:p>
+        </p:txBody>
+      </p:sp>
+      <p:sp>
+        <p:nvSpPr>
+          <p:cNvPr id="12" name="TextBox 11">
+            <a:extLst>
+              <a:ext uri="{FF2B5EF4-FFF2-40B4-BE49-F238E27FC236}">
+                <a16:creationId xmlns:a16="http://schemas.microsoft.com/office/drawing/2014/main" id="{746B2C31-FA0B-46FE-8943-7254BCEF2D15}"/>
+              </a:ext>
+            </a:extLst>
+          </p:cNvPr>
+          <p:cNvSpPr txBox="1"/>
+          <p:nvPr/>
+        </p:nvSpPr>
+        <p:spPr>
+          <a:xfrm>
+            <a:off x="1596665" y="6086983"/>
+            <a:ext cx="2082607" cy="246221"/>
+          </a:xfrm>
+          <a:prstGeom prst="rect">
+            <a:avLst/>
+          </a:prstGeom>
+          <a:solidFill>
+            <a:schemeClr val="accent2"/>
+          </a:solidFill>
+          <a:ln w="9525">
             <a:solidFill>
-              <a:schemeClr val="accent2"/>
+              <a:schemeClr val="tx1"/>
             </a:solidFill>
-            <a:ln w="9525">
-              <a:solidFill>
-                <a:schemeClr val="tx1"/>
-              </a:solidFill>
-            </a:ln>
-          </p:spPr>
-          <p:txBody>
-            <a:bodyPr wrap="square" rtlCol="0">
-              <a:spAutoFit/>
-            </a:bodyPr>
-            <a:lstStyle/>
-            <a:p>
-              <a:pPr algn="ctr"/>
-              <a:r>
-                <a:rPr lang="en-US" sz="1000" dirty="0"/>
-                <a:t>Soil porosity</a:t>
-              </a:r>
-            </a:p>
-          </p:txBody>
-        </p:sp>
-        <p:sp>
-          <p:nvSpPr>
-            <p:cNvPr id="12" name="TextBox 11">
-              <a:extLst>
-                <a:ext uri="{FF2B5EF4-FFF2-40B4-BE49-F238E27FC236}">
-                  <a16:creationId xmlns:a16="http://schemas.microsoft.com/office/drawing/2014/main" id="{746B2C31-FA0B-46FE-8943-7254BCEF2D15}"/>
-                </a:ext>
-              </a:extLst>
-            </p:cNvPr>
-            <p:cNvSpPr txBox="1"/>
-            <p:nvPr/>
-          </p:nvSpPr>
-          <p:spPr>
-            <a:xfrm>
-              <a:off x="1596665" y="5977654"/>
-              <a:ext cx="2082607" cy="246221"/>
-            </a:xfrm>
-            <a:prstGeom prst="rect">
-              <a:avLst/>
-            </a:prstGeom>
+          </a:ln>
+        </p:spPr>
+        <p:txBody>
+          <a:bodyPr wrap="square" rtlCol="0">
+            <a:spAutoFit/>
+          </a:bodyPr>
+          <a:lstStyle/>
+          <a:p>
+            <a:pPr algn="ctr"/>
+            <a:r>
+              <a:rPr lang="en-US" sz="1000" dirty="0"/>
+              <a:t>Capillary forces</a:t>
+            </a:r>
+          </a:p>
+        </p:txBody>
+      </p:sp>
+      <p:sp>
+        <p:nvSpPr>
+          <p:cNvPr id="16" name="TextBox 15">
+            <a:extLst>
+              <a:ext uri="{FF2B5EF4-FFF2-40B4-BE49-F238E27FC236}">
+                <a16:creationId xmlns:a16="http://schemas.microsoft.com/office/drawing/2014/main" id="{6EFC2D2F-82ED-4332-86E1-5D3DCB71E395}"/>
+              </a:ext>
+            </a:extLst>
+          </p:cNvPr>
+          <p:cNvSpPr txBox="1"/>
+          <p:nvPr/>
+        </p:nvSpPr>
+        <p:spPr>
+          <a:xfrm>
+            <a:off x="4104087" y="1991202"/>
+            <a:ext cx="655608" cy="400110"/>
+          </a:xfrm>
+          <a:prstGeom prst="rect">
+            <a:avLst/>
+          </a:prstGeom>
+          <a:solidFill>
+            <a:schemeClr val="accent2"/>
+          </a:solidFill>
+          <a:ln w="9525">
             <a:solidFill>
-              <a:schemeClr val="accent2"/>
+              <a:schemeClr val="tx1"/>
             </a:solidFill>
-            <a:ln w="9525">
-              <a:solidFill>
-                <a:schemeClr val="tx1"/>
-              </a:solidFill>
-            </a:ln>
-          </p:spPr>
-          <p:txBody>
-            <a:bodyPr wrap="square" rtlCol="0">
-              <a:spAutoFit/>
-            </a:bodyPr>
-            <a:lstStyle/>
-            <a:p>
-              <a:pPr algn="ctr"/>
-              <a:r>
-                <a:rPr lang="en-US" sz="1000" dirty="0"/>
-                <a:t>Capillary forces</a:t>
-              </a:r>
-            </a:p>
-          </p:txBody>
-        </p:sp>
-        <p:sp>
-          <p:nvSpPr>
-            <p:cNvPr id="16" name="TextBox 15">
-              <a:extLst>
-                <a:ext uri="{FF2B5EF4-FFF2-40B4-BE49-F238E27FC236}">
-                  <a16:creationId xmlns:a16="http://schemas.microsoft.com/office/drawing/2014/main" id="{6EFC2D2F-82ED-4332-86E1-5D3DCB71E395}"/>
-                </a:ext>
-              </a:extLst>
-            </p:cNvPr>
-            <p:cNvSpPr txBox="1"/>
-            <p:nvPr/>
-          </p:nvSpPr>
-          <p:spPr>
-            <a:xfrm>
-              <a:off x="4104087" y="1991202"/>
-              <a:ext cx="655608" cy="400110"/>
-            </a:xfrm>
-            <a:prstGeom prst="rect">
-              <a:avLst/>
-            </a:prstGeom>
+          </a:ln>
+        </p:spPr>
+        <p:txBody>
+          <a:bodyPr wrap="square" rtlCol="0">
+            <a:spAutoFit/>
+          </a:bodyPr>
+          <a:lstStyle/>
+          <a:p>
+            <a:pPr algn="ctr"/>
+            <a:r>
+              <a:rPr lang="en-US" sz="1000" dirty="0"/>
+              <a:t>Soil Biology</a:t>
+            </a:r>
+          </a:p>
+        </p:txBody>
+      </p:sp>
+      <p:sp>
+        <p:nvSpPr>
+          <p:cNvPr id="96" name="TextBox 95">
+            <a:extLst>
+              <a:ext uri="{FF2B5EF4-FFF2-40B4-BE49-F238E27FC236}">
+                <a16:creationId xmlns:a16="http://schemas.microsoft.com/office/drawing/2014/main" id="{072EE3DC-7571-43F1-B7BC-E9FB70EDEBA6}"/>
+              </a:ext>
+            </a:extLst>
+          </p:cNvPr>
+          <p:cNvSpPr txBox="1"/>
+          <p:nvPr/>
+        </p:nvSpPr>
+        <p:spPr>
+          <a:xfrm>
+            <a:off x="4117845" y="6526289"/>
+            <a:ext cx="873188" cy="400110"/>
+          </a:xfrm>
+          <a:prstGeom prst="rect">
+            <a:avLst/>
+          </a:prstGeom>
+          <a:solidFill>
+            <a:schemeClr val="bg2"/>
+          </a:solidFill>
+          <a:ln w="9525">
             <a:solidFill>
-              <a:schemeClr val="accent2"/>
+              <a:schemeClr val="tx1"/>
             </a:solidFill>
-            <a:ln w="9525">
-              <a:solidFill>
-                <a:schemeClr val="tx1"/>
-              </a:solidFill>
-            </a:ln>
-          </p:spPr>
-          <p:txBody>
-            <a:bodyPr wrap="square" rtlCol="0">
-              <a:spAutoFit/>
-            </a:bodyPr>
-            <a:lstStyle/>
-            <a:p>
-              <a:pPr algn="ctr"/>
-              <a:r>
-                <a:rPr lang="en-US" sz="1000" dirty="0"/>
-                <a:t>Soil Biology</a:t>
-              </a:r>
-            </a:p>
-          </p:txBody>
-        </p:sp>
-        <p:sp>
-          <p:nvSpPr>
-            <p:cNvPr id="96" name="TextBox 95">
-              <a:extLst>
-                <a:ext uri="{FF2B5EF4-FFF2-40B4-BE49-F238E27FC236}">
-                  <a16:creationId xmlns:a16="http://schemas.microsoft.com/office/drawing/2014/main" id="{072EE3DC-7571-43F1-B7BC-E9FB70EDEBA6}"/>
-                </a:ext>
-              </a:extLst>
-            </p:cNvPr>
-            <p:cNvSpPr txBox="1"/>
-            <p:nvPr/>
-          </p:nvSpPr>
-          <p:spPr>
-            <a:xfrm>
-              <a:off x="4117845" y="6526289"/>
-              <a:ext cx="873188" cy="400110"/>
-            </a:xfrm>
-            <a:prstGeom prst="rect">
-              <a:avLst/>
-            </a:prstGeom>
-            <a:solidFill>
-              <a:schemeClr val="bg2"/>
-            </a:solidFill>
-            <a:ln w="9525">
-              <a:solidFill>
-                <a:schemeClr val="tx1"/>
-              </a:solidFill>
-            </a:ln>
-          </p:spPr>
-          <p:txBody>
-            <a:bodyPr wrap="square" rtlCol="0">
-              <a:spAutoFit/>
-            </a:bodyPr>
-            <a:lstStyle/>
-            <a:p>
-              <a:pPr algn="ctr"/>
-              <a:r>
-                <a:rPr lang="en-US" sz="1000" dirty="0"/>
-                <a:t>Total soil water</a:t>
-              </a:r>
-            </a:p>
-          </p:txBody>
-        </p:sp>
-        <p:sp>
-          <p:nvSpPr>
-            <p:cNvPr id="53" name="Rectangle 52">
-              <a:extLst>
-                <a:ext uri="{FF2B5EF4-FFF2-40B4-BE49-F238E27FC236}">
-                  <a16:creationId xmlns:a16="http://schemas.microsoft.com/office/drawing/2014/main" id="{9D7E2AF7-1946-4EEA-83B6-3F3D8E0738EE}"/>
-                </a:ext>
-              </a:extLst>
-            </p:cNvPr>
-            <p:cNvSpPr/>
-            <p:nvPr/>
-          </p:nvSpPr>
-          <p:spPr>
-            <a:xfrm>
-              <a:off x="1788291" y="3650760"/>
-              <a:ext cx="148990" cy="95788"/>
-            </a:xfrm>
-            <a:prstGeom prst="rect">
-              <a:avLst/>
-            </a:prstGeom>
+          </a:ln>
+        </p:spPr>
+        <p:txBody>
+          <a:bodyPr wrap="square" rtlCol="0">
+            <a:spAutoFit/>
+          </a:bodyPr>
+          <a:lstStyle/>
+          <a:p>
+            <a:pPr algn="ctr"/>
+            <a:r>
+              <a:rPr lang="en-US" sz="1000" dirty="0" smtClean="0"/>
+              <a:t>(2) Soil water at saturation</a:t>
+            </a:r>
+            <a:endParaRPr lang="en-US" sz="1000" dirty="0"/>
+          </a:p>
+        </p:txBody>
+      </p:sp>
+      <p:sp>
+        <p:nvSpPr>
+          <p:cNvPr id="53" name="Rectangle 52">
+            <a:extLst>
+              <a:ext uri="{FF2B5EF4-FFF2-40B4-BE49-F238E27FC236}">
+                <a16:creationId xmlns:a16="http://schemas.microsoft.com/office/drawing/2014/main" id="{9D7E2AF7-1946-4EEA-83B6-3F3D8E0738EE}"/>
+              </a:ext>
+            </a:extLst>
+          </p:cNvPr>
+          <p:cNvSpPr/>
+          <p:nvPr/>
+        </p:nvSpPr>
+        <p:spPr>
+          <a:xfrm>
+            <a:off x="1788291" y="3650760"/>
+            <a:ext cx="148990" cy="95788"/>
+          </a:xfrm>
+          <a:prstGeom prst="rect">
+            <a:avLst/>
+          </a:prstGeom>
+          <a:solidFill>
+            <a:schemeClr val="bg1"/>
+          </a:solidFill>
+          <a:ln w="9525">
             <a:solidFill>
               <a:schemeClr val="bg1"/>
             </a:solidFill>
-            <a:ln w="9525">
-              <a:solidFill>
-                <a:schemeClr val="bg1"/>
-              </a:solidFill>
-            </a:ln>
-          </p:spPr>
-          <p:style>
-            <a:lnRef idx="2">
-              <a:schemeClr val="accent1">
-                <a:shade val="50000"/>
-              </a:schemeClr>
-            </a:lnRef>
-            <a:fillRef idx="1">
-              <a:schemeClr val="accent1"/>
-            </a:fillRef>
-            <a:effectRef idx="0">
-              <a:schemeClr val="accent1"/>
-            </a:effectRef>
-            <a:fontRef idx="minor">
-              <a:schemeClr val="lt1"/>
-            </a:fontRef>
-          </p:style>
-          <p:txBody>
-            <a:bodyPr rtlCol="0" anchor="ctr"/>
-            <a:lstStyle/>
-            <a:p>
-              <a:pPr algn="ctr"/>
-              <a:endParaRPr lang="en-US"/>
-            </a:p>
-          </p:txBody>
-        </p:sp>
-        <p:cxnSp>
-          <p:nvCxnSpPr>
-            <p:cNvPr id="156" name="Straight Arrow Connector 155">
-              <a:extLst>
-                <a:ext uri="{FF2B5EF4-FFF2-40B4-BE49-F238E27FC236}">
-                  <a16:creationId xmlns:a16="http://schemas.microsoft.com/office/drawing/2014/main" id="{F2F5C4B5-3009-4604-B153-A758FB3D3B9F}"/>
-                </a:ext>
-              </a:extLst>
-            </p:cNvPr>
-            <p:cNvCxnSpPr>
-              <a:cxnSpLocks/>
-            </p:cNvCxnSpPr>
-            <p:nvPr/>
-          </p:nvCxnSpPr>
-          <p:spPr>
-            <a:xfrm>
-              <a:off x="1874209" y="3099066"/>
-              <a:ext cx="1" cy="766136"/>
-            </a:xfrm>
-            <a:prstGeom prst="straightConnector1">
-              <a:avLst/>
-            </a:prstGeom>
-            <a:ln w="9525">
-              <a:solidFill>
-                <a:schemeClr val="tx1"/>
-              </a:solidFill>
-              <a:tailEnd type="triangle"/>
-            </a:ln>
-          </p:spPr>
-          <p:style>
-            <a:lnRef idx="1">
-              <a:schemeClr val="accent1"/>
-            </a:lnRef>
-            <a:fillRef idx="0">
-              <a:schemeClr val="accent1"/>
-            </a:fillRef>
-            <a:effectRef idx="0">
-              <a:schemeClr val="accent1"/>
-            </a:effectRef>
-            <a:fontRef idx="minor">
+          </a:ln>
+        </p:spPr>
+        <p:style>
+          <a:lnRef idx="2">
+            <a:schemeClr val="accent1">
+              <a:shade val="50000"/>
+            </a:schemeClr>
+          </a:lnRef>
+          <a:fillRef idx="1">
+            <a:schemeClr val="accent1"/>
+          </a:fillRef>
+          <a:effectRef idx="0">
+            <a:schemeClr val="accent1"/>
+          </a:effectRef>
+          <a:fontRef idx="minor">
+            <a:schemeClr val="lt1"/>
+          </a:fontRef>
+        </p:style>
+        <p:txBody>
+          <a:bodyPr rtlCol="0" anchor="ctr"/>
+          <a:lstStyle/>
+          <a:p>
+            <a:pPr algn="ctr"/>
+            <a:endParaRPr lang="en-US"/>
+          </a:p>
+        </p:txBody>
+      </p:sp>
+      <p:cxnSp>
+        <p:nvCxnSpPr>
+          <p:cNvPr id="156" name="Straight Arrow Connector 155">
+            <a:extLst>
+              <a:ext uri="{FF2B5EF4-FFF2-40B4-BE49-F238E27FC236}">
+                <a16:creationId xmlns:a16="http://schemas.microsoft.com/office/drawing/2014/main" id="{F2F5C4B5-3009-4604-B153-A758FB3D3B9F}"/>
+              </a:ext>
+            </a:extLst>
+          </p:cNvPr>
+          <p:cNvCxnSpPr>
+            <a:cxnSpLocks/>
+          </p:cNvCxnSpPr>
+          <p:nvPr/>
+        </p:nvCxnSpPr>
+        <p:spPr>
+          <a:xfrm>
+            <a:off x="1874209" y="3099066"/>
+            <a:ext cx="1" cy="766136"/>
+          </a:xfrm>
+          <a:prstGeom prst="straightConnector1">
+            <a:avLst/>
+          </a:prstGeom>
+          <a:ln w="9525">
+            <a:solidFill>
               <a:schemeClr val="tx1"/>
-            </a:fontRef>
-          </p:style>
-        </p:cxnSp>
-        <p:sp>
-          <p:nvSpPr>
-            <p:cNvPr id="55" name="Rectangle 54">
-              <a:extLst>
-                <a:ext uri="{FF2B5EF4-FFF2-40B4-BE49-F238E27FC236}">
-                  <a16:creationId xmlns:a16="http://schemas.microsoft.com/office/drawing/2014/main" id="{23B64D1E-71E7-4B90-852C-1FFD78174AB2}"/>
-                </a:ext>
-              </a:extLst>
-            </p:cNvPr>
-            <p:cNvSpPr/>
-            <p:nvPr/>
-          </p:nvSpPr>
-          <p:spPr>
-            <a:xfrm>
-              <a:off x="1749149" y="5049716"/>
-              <a:ext cx="123132" cy="95788"/>
-            </a:xfrm>
-            <a:prstGeom prst="rect">
-              <a:avLst/>
-            </a:prstGeom>
+            </a:solidFill>
+            <a:tailEnd type="triangle"/>
+          </a:ln>
+        </p:spPr>
+        <p:style>
+          <a:lnRef idx="1">
+            <a:schemeClr val="accent1"/>
+          </a:lnRef>
+          <a:fillRef idx="0">
+            <a:schemeClr val="accent1"/>
+          </a:fillRef>
+          <a:effectRef idx="0">
+            <a:schemeClr val="accent1"/>
+          </a:effectRef>
+          <a:fontRef idx="minor">
+            <a:schemeClr val="tx1"/>
+          </a:fontRef>
+        </p:style>
+      </p:cxnSp>
+      <p:sp>
+        <p:nvSpPr>
+          <p:cNvPr id="55" name="Rectangle 54">
+            <a:extLst>
+              <a:ext uri="{FF2B5EF4-FFF2-40B4-BE49-F238E27FC236}">
+                <a16:creationId xmlns:a16="http://schemas.microsoft.com/office/drawing/2014/main" id="{23B64D1E-71E7-4B90-852C-1FFD78174AB2}"/>
+              </a:ext>
+            </a:extLst>
+          </p:cNvPr>
+          <p:cNvSpPr/>
+          <p:nvPr/>
+        </p:nvSpPr>
+        <p:spPr>
+          <a:xfrm>
+            <a:off x="1749149" y="5049716"/>
+            <a:ext cx="123132" cy="95788"/>
+          </a:xfrm>
+          <a:prstGeom prst="rect">
+            <a:avLst/>
+          </a:prstGeom>
+          <a:solidFill>
+            <a:schemeClr val="bg1"/>
+          </a:solidFill>
+          <a:ln w="9525">
             <a:solidFill>
               <a:schemeClr val="bg1"/>
             </a:solidFill>
-            <a:ln w="9525">
-              <a:solidFill>
-                <a:schemeClr val="bg1"/>
-              </a:solidFill>
-            </a:ln>
-          </p:spPr>
-          <p:style>
-            <a:lnRef idx="2">
-              <a:schemeClr val="accent1">
-                <a:shade val="50000"/>
-              </a:schemeClr>
-            </a:lnRef>
-            <a:fillRef idx="1">
-              <a:schemeClr val="accent1"/>
-            </a:fillRef>
-            <a:effectRef idx="0">
-              <a:schemeClr val="accent1"/>
-            </a:effectRef>
-            <a:fontRef idx="minor">
-              <a:schemeClr val="lt1"/>
-            </a:fontRef>
-          </p:style>
-          <p:txBody>
-            <a:bodyPr rtlCol="0" anchor="ctr"/>
-            <a:lstStyle/>
-            <a:p>
-              <a:pPr algn="ctr"/>
-              <a:endParaRPr lang="en-US"/>
-            </a:p>
-          </p:txBody>
-        </p:sp>
-        <p:sp>
-          <p:nvSpPr>
-            <p:cNvPr id="56" name="Rectangle 55">
-              <a:extLst>
-                <a:ext uri="{FF2B5EF4-FFF2-40B4-BE49-F238E27FC236}">
-                  <a16:creationId xmlns:a16="http://schemas.microsoft.com/office/drawing/2014/main" id="{36661A51-A0F5-4A10-BC66-CD93694E17DC}"/>
-                </a:ext>
-              </a:extLst>
-            </p:cNvPr>
-            <p:cNvSpPr/>
-            <p:nvPr/>
-          </p:nvSpPr>
-          <p:spPr>
-            <a:xfrm>
-              <a:off x="2609375" y="5030293"/>
-              <a:ext cx="123132" cy="95788"/>
-            </a:xfrm>
-            <a:prstGeom prst="rect">
-              <a:avLst/>
-            </a:prstGeom>
+          </a:ln>
+        </p:spPr>
+        <p:style>
+          <a:lnRef idx="2">
+            <a:schemeClr val="accent1">
+              <a:shade val="50000"/>
+            </a:schemeClr>
+          </a:lnRef>
+          <a:fillRef idx="1">
+            <a:schemeClr val="accent1"/>
+          </a:fillRef>
+          <a:effectRef idx="0">
+            <a:schemeClr val="accent1"/>
+          </a:effectRef>
+          <a:fontRef idx="minor">
+            <a:schemeClr val="lt1"/>
+          </a:fontRef>
+        </p:style>
+        <p:txBody>
+          <a:bodyPr rtlCol="0" anchor="ctr"/>
+          <a:lstStyle/>
+          <a:p>
+            <a:pPr algn="ctr"/>
+            <a:endParaRPr lang="en-US"/>
+          </a:p>
+        </p:txBody>
+      </p:sp>
+      <p:sp>
+        <p:nvSpPr>
+          <p:cNvPr id="56" name="Rectangle 55">
+            <a:extLst>
+              <a:ext uri="{FF2B5EF4-FFF2-40B4-BE49-F238E27FC236}">
+                <a16:creationId xmlns:a16="http://schemas.microsoft.com/office/drawing/2014/main" id="{36661A51-A0F5-4A10-BC66-CD93694E17DC}"/>
+              </a:ext>
+            </a:extLst>
+          </p:cNvPr>
+          <p:cNvSpPr/>
+          <p:nvPr/>
+        </p:nvSpPr>
+        <p:spPr>
+          <a:xfrm>
+            <a:off x="2609375" y="5030293"/>
+            <a:ext cx="123132" cy="95788"/>
+          </a:xfrm>
+          <a:prstGeom prst="rect">
+            <a:avLst/>
+          </a:prstGeom>
+          <a:solidFill>
+            <a:schemeClr val="bg1"/>
+          </a:solidFill>
+          <a:ln w="9525">
             <a:solidFill>
               <a:schemeClr val="bg1"/>
             </a:solidFill>
-            <a:ln w="9525">
-              <a:solidFill>
-                <a:schemeClr val="bg1"/>
-              </a:solidFill>
-            </a:ln>
-          </p:spPr>
-          <p:style>
-            <a:lnRef idx="2">
-              <a:schemeClr val="accent1">
-                <a:shade val="50000"/>
-              </a:schemeClr>
-            </a:lnRef>
-            <a:fillRef idx="1">
-              <a:schemeClr val="accent1"/>
-            </a:fillRef>
-            <a:effectRef idx="0">
-              <a:schemeClr val="accent1"/>
-            </a:effectRef>
-            <a:fontRef idx="minor">
-              <a:schemeClr val="lt1"/>
-            </a:fontRef>
-          </p:style>
-          <p:txBody>
-            <a:bodyPr rtlCol="0" anchor="ctr"/>
-            <a:lstStyle/>
-            <a:p>
-              <a:pPr algn="ctr"/>
-              <a:endParaRPr lang="en-US"/>
-            </a:p>
-          </p:txBody>
-        </p:sp>
-        <p:cxnSp>
-          <p:nvCxnSpPr>
-            <p:cNvPr id="172" name="Straight Arrow Connector 171">
-              <a:extLst>
-                <a:ext uri="{FF2B5EF4-FFF2-40B4-BE49-F238E27FC236}">
-                  <a16:creationId xmlns:a16="http://schemas.microsoft.com/office/drawing/2014/main" id="{FC8C7FFC-E011-4F67-A04C-8CFC4A5730E2}"/>
-                </a:ext>
-              </a:extLst>
-            </p:cNvPr>
-            <p:cNvCxnSpPr>
-              <a:cxnSpLocks/>
-            </p:cNvCxnSpPr>
-            <p:nvPr/>
-          </p:nvCxnSpPr>
-          <p:spPr>
-            <a:xfrm flipH="1">
-              <a:off x="2685100" y="4059670"/>
-              <a:ext cx="2283" cy="1375601"/>
-            </a:xfrm>
-            <a:prstGeom prst="straightConnector1">
-              <a:avLst/>
-            </a:prstGeom>
-            <a:ln w="9525">
-              <a:solidFill>
-                <a:schemeClr val="tx1"/>
-              </a:solidFill>
-              <a:tailEnd type="triangle"/>
-            </a:ln>
-          </p:spPr>
-          <p:style>
-            <a:lnRef idx="1">
-              <a:schemeClr val="accent1"/>
-            </a:lnRef>
-            <a:fillRef idx="0">
-              <a:schemeClr val="accent1"/>
-            </a:fillRef>
-            <a:effectRef idx="0">
-              <a:schemeClr val="accent1"/>
-            </a:effectRef>
-            <a:fontRef idx="minor">
+          </a:ln>
+        </p:spPr>
+        <p:style>
+          <a:lnRef idx="2">
+            <a:schemeClr val="accent1">
+              <a:shade val="50000"/>
+            </a:schemeClr>
+          </a:lnRef>
+          <a:fillRef idx="1">
+            <a:schemeClr val="accent1"/>
+          </a:fillRef>
+          <a:effectRef idx="0">
+            <a:schemeClr val="accent1"/>
+          </a:effectRef>
+          <a:fontRef idx="minor">
+            <a:schemeClr val="lt1"/>
+          </a:fontRef>
+        </p:style>
+        <p:txBody>
+          <a:bodyPr rtlCol="0" anchor="ctr"/>
+          <a:lstStyle/>
+          <a:p>
+            <a:pPr algn="ctr"/>
+            <a:endParaRPr lang="en-US"/>
+          </a:p>
+        </p:txBody>
+      </p:sp>
+      <p:cxnSp>
+        <p:nvCxnSpPr>
+          <p:cNvPr id="172" name="Straight Arrow Connector 171">
+            <a:extLst>
+              <a:ext uri="{FF2B5EF4-FFF2-40B4-BE49-F238E27FC236}">
+                <a16:creationId xmlns:a16="http://schemas.microsoft.com/office/drawing/2014/main" id="{FC8C7FFC-E011-4F67-A04C-8CFC4A5730E2}"/>
+              </a:ext>
+            </a:extLst>
+          </p:cNvPr>
+          <p:cNvCxnSpPr>
+            <a:cxnSpLocks/>
+          </p:cNvCxnSpPr>
+          <p:nvPr/>
+        </p:nvCxnSpPr>
+        <p:spPr>
+          <a:xfrm flipH="1">
+            <a:off x="2685100" y="4059670"/>
+            <a:ext cx="2283" cy="1375601"/>
+          </a:xfrm>
+          <a:prstGeom prst="straightConnector1">
+            <a:avLst/>
+          </a:prstGeom>
+          <a:ln w="9525">
+            <a:solidFill>
               <a:schemeClr val="tx1"/>
-            </a:fontRef>
-          </p:style>
-        </p:cxnSp>
-        <p:cxnSp>
-          <p:nvCxnSpPr>
-            <p:cNvPr id="173" name="Straight Arrow Connector 172">
-              <a:extLst>
-                <a:ext uri="{FF2B5EF4-FFF2-40B4-BE49-F238E27FC236}">
-                  <a16:creationId xmlns:a16="http://schemas.microsoft.com/office/drawing/2014/main" id="{8805674A-7166-4CBD-9F3E-9EB4FB455B28}"/>
-                </a:ext>
-              </a:extLst>
-            </p:cNvPr>
-            <p:cNvCxnSpPr>
-              <a:cxnSpLocks/>
-            </p:cNvCxnSpPr>
-            <p:nvPr/>
-          </p:nvCxnSpPr>
-          <p:spPr>
-            <a:xfrm flipH="1">
-              <a:off x="1788783" y="4427875"/>
-              <a:ext cx="4104" cy="990970"/>
-            </a:xfrm>
-            <a:prstGeom prst="straightConnector1">
-              <a:avLst/>
-            </a:prstGeom>
-            <a:ln w="9525">
-              <a:solidFill>
-                <a:schemeClr val="tx1"/>
-              </a:solidFill>
-              <a:tailEnd type="triangle"/>
-            </a:ln>
-          </p:spPr>
-          <p:style>
-            <a:lnRef idx="1">
-              <a:schemeClr val="accent1"/>
-            </a:lnRef>
-            <a:fillRef idx="0">
-              <a:schemeClr val="accent1"/>
-            </a:fillRef>
-            <a:effectRef idx="0">
-              <a:schemeClr val="accent1"/>
-            </a:effectRef>
-            <a:fontRef idx="minor">
+            </a:solidFill>
+            <a:tailEnd type="triangle"/>
+          </a:ln>
+        </p:spPr>
+        <p:style>
+          <a:lnRef idx="1">
+            <a:schemeClr val="accent1"/>
+          </a:lnRef>
+          <a:fillRef idx="0">
+            <a:schemeClr val="accent1"/>
+          </a:fillRef>
+          <a:effectRef idx="0">
+            <a:schemeClr val="accent1"/>
+          </a:effectRef>
+          <a:fontRef idx="minor">
+            <a:schemeClr val="tx1"/>
+          </a:fontRef>
+        </p:style>
+      </p:cxnSp>
+      <p:cxnSp>
+        <p:nvCxnSpPr>
+          <p:cNvPr id="173" name="Straight Arrow Connector 172">
+            <a:extLst>
+              <a:ext uri="{FF2B5EF4-FFF2-40B4-BE49-F238E27FC236}">
+                <a16:creationId xmlns:a16="http://schemas.microsoft.com/office/drawing/2014/main" id="{8805674A-7166-4CBD-9F3E-9EB4FB455B28}"/>
+              </a:ext>
+            </a:extLst>
+          </p:cNvPr>
+          <p:cNvCxnSpPr>
+            <a:cxnSpLocks/>
+          </p:cNvCxnSpPr>
+          <p:nvPr/>
+        </p:nvCxnSpPr>
+        <p:spPr>
+          <a:xfrm flipH="1">
+            <a:off x="1788783" y="4427875"/>
+            <a:ext cx="4104" cy="990970"/>
+          </a:xfrm>
+          <a:prstGeom prst="straightConnector1">
+            <a:avLst/>
+          </a:prstGeom>
+          <a:ln w="9525">
+            <a:solidFill>
               <a:schemeClr val="tx1"/>
-            </a:fontRef>
-          </p:style>
-        </p:cxnSp>
-        <p:sp>
-          <p:nvSpPr>
-            <p:cNvPr id="58" name="Rectangle 57">
-              <a:extLst>
-                <a:ext uri="{FF2B5EF4-FFF2-40B4-BE49-F238E27FC236}">
-                  <a16:creationId xmlns:a16="http://schemas.microsoft.com/office/drawing/2014/main" id="{5E006E4D-0623-40B1-B8A2-E05513A47854}"/>
-                </a:ext>
-              </a:extLst>
-            </p:cNvPr>
-            <p:cNvSpPr/>
-            <p:nvPr/>
-          </p:nvSpPr>
-          <p:spPr>
-            <a:xfrm>
-              <a:off x="3314081" y="3891859"/>
-              <a:ext cx="123132" cy="95788"/>
-            </a:xfrm>
-            <a:prstGeom prst="rect">
-              <a:avLst/>
-            </a:prstGeom>
+            </a:solidFill>
+            <a:tailEnd type="triangle"/>
+          </a:ln>
+        </p:spPr>
+        <p:style>
+          <a:lnRef idx="1">
+            <a:schemeClr val="accent1"/>
+          </a:lnRef>
+          <a:fillRef idx="0">
+            <a:schemeClr val="accent1"/>
+          </a:fillRef>
+          <a:effectRef idx="0">
+            <a:schemeClr val="accent1"/>
+          </a:effectRef>
+          <a:fontRef idx="minor">
+            <a:schemeClr val="tx1"/>
+          </a:fontRef>
+        </p:style>
+      </p:cxnSp>
+      <p:sp>
+        <p:nvSpPr>
+          <p:cNvPr id="58" name="Rectangle 57">
+            <a:extLst>
+              <a:ext uri="{FF2B5EF4-FFF2-40B4-BE49-F238E27FC236}">
+                <a16:creationId xmlns:a16="http://schemas.microsoft.com/office/drawing/2014/main" id="{5E006E4D-0623-40B1-B8A2-E05513A47854}"/>
+              </a:ext>
+            </a:extLst>
+          </p:cNvPr>
+          <p:cNvSpPr/>
+          <p:nvPr/>
+        </p:nvSpPr>
+        <p:spPr>
+          <a:xfrm>
+            <a:off x="3314081" y="3891859"/>
+            <a:ext cx="123132" cy="95788"/>
+          </a:xfrm>
+          <a:prstGeom prst="rect">
+            <a:avLst/>
+          </a:prstGeom>
+          <a:solidFill>
+            <a:schemeClr val="bg1"/>
+          </a:solidFill>
+          <a:ln w="9525">
             <a:solidFill>
               <a:schemeClr val="bg1"/>
             </a:solidFill>
-            <a:ln w="9525">
-              <a:solidFill>
-                <a:schemeClr val="bg1"/>
-              </a:solidFill>
-            </a:ln>
-          </p:spPr>
-          <p:style>
-            <a:lnRef idx="2">
-              <a:schemeClr val="accent1">
-                <a:shade val="50000"/>
-              </a:schemeClr>
-            </a:lnRef>
-            <a:fillRef idx="1">
-              <a:schemeClr val="accent1"/>
-            </a:fillRef>
-            <a:effectRef idx="0">
-              <a:schemeClr val="accent1"/>
-            </a:effectRef>
-            <a:fontRef idx="minor">
-              <a:schemeClr val="lt1"/>
-            </a:fontRef>
-          </p:style>
-          <p:txBody>
-            <a:bodyPr rtlCol="0" anchor="ctr"/>
-            <a:lstStyle/>
-            <a:p>
-              <a:pPr algn="ctr"/>
-              <a:endParaRPr lang="en-US"/>
-            </a:p>
-          </p:txBody>
-        </p:sp>
-        <p:cxnSp>
-          <p:nvCxnSpPr>
-            <p:cNvPr id="92" name="Straight Arrow Connector 91">
-              <a:extLst>
-                <a:ext uri="{FF2B5EF4-FFF2-40B4-BE49-F238E27FC236}">
-                  <a16:creationId xmlns:a16="http://schemas.microsoft.com/office/drawing/2014/main" id="{D1103426-A3EB-44E5-B05A-CF3D80637CAA}"/>
-                </a:ext>
-              </a:extLst>
-            </p:cNvPr>
-            <p:cNvCxnSpPr>
-              <a:cxnSpLocks/>
-            </p:cNvCxnSpPr>
-            <p:nvPr/>
-          </p:nvCxnSpPr>
-          <p:spPr>
-            <a:xfrm>
-              <a:off x="3378533" y="2501596"/>
-              <a:ext cx="0" cy="2387063"/>
-            </a:xfrm>
-            <a:prstGeom prst="straightConnector1">
-              <a:avLst/>
-            </a:prstGeom>
-            <a:ln w="9525">
-              <a:solidFill>
-                <a:schemeClr val="tx1"/>
-              </a:solidFill>
-              <a:tailEnd type="triangle"/>
-            </a:ln>
-          </p:spPr>
-          <p:style>
-            <a:lnRef idx="1">
-              <a:schemeClr val="accent1"/>
-            </a:lnRef>
-            <a:fillRef idx="0">
-              <a:schemeClr val="accent1"/>
-            </a:fillRef>
-            <a:effectRef idx="0">
-              <a:schemeClr val="accent1"/>
-            </a:effectRef>
-            <a:fontRef idx="minor">
+          </a:ln>
+        </p:spPr>
+        <p:style>
+          <a:lnRef idx="2">
+            <a:schemeClr val="accent1">
+              <a:shade val="50000"/>
+            </a:schemeClr>
+          </a:lnRef>
+          <a:fillRef idx="1">
+            <a:schemeClr val="accent1"/>
+          </a:fillRef>
+          <a:effectRef idx="0">
+            <a:schemeClr val="accent1"/>
+          </a:effectRef>
+          <a:fontRef idx="minor">
+            <a:schemeClr val="lt1"/>
+          </a:fontRef>
+        </p:style>
+        <p:txBody>
+          <a:bodyPr rtlCol="0" anchor="ctr"/>
+          <a:lstStyle/>
+          <a:p>
+            <a:pPr algn="ctr"/>
+            <a:endParaRPr lang="en-US"/>
+          </a:p>
+        </p:txBody>
+      </p:sp>
+      <p:cxnSp>
+        <p:nvCxnSpPr>
+          <p:cNvPr id="92" name="Straight Arrow Connector 91">
+            <a:extLst>
+              <a:ext uri="{FF2B5EF4-FFF2-40B4-BE49-F238E27FC236}">
+                <a16:creationId xmlns:a16="http://schemas.microsoft.com/office/drawing/2014/main" id="{D1103426-A3EB-44E5-B05A-CF3D80637CAA}"/>
+              </a:ext>
+            </a:extLst>
+          </p:cNvPr>
+          <p:cNvCxnSpPr>
+            <a:cxnSpLocks/>
+          </p:cNvCxnSpPr>
+          <p:nvPr/>
+        </p:nvCxnSpPr>
+        <p:spPr>
+          <a:xfrm>
+            <a:off x="3378533" y="2501596"/>
+            <a:ext cx="0" cy="2387063"/>
+          </a:xfrm>
+          <a:prstGeom prst="straightConnector1">
+            <a:avLst/>
+          </a:prstGeom>
+          <a:ln w="9525">
+            <a:solidFill>
               <a:schemeClr val="tx1"/>
-            </a:fontRef>
-          </p:style>
-        </p:cxnSp>
-        <p:sp>
-          <p:nvSpPr>
-            <p:cNvPr id="85" name="TextBox 84">
-              <a:extLst>
-                <a:ext uri="{FF2B5EF4-FFF2-40B4-BE49-F238E27FC236}">
-                  <a16:creationId xmlns:a16="http://schemas.microsoft.com/office/drawing/2014/main" id="{CF804AB6-B196-45FB-8F8E-BCF2A0FB4871}"/>
-                </a:ext>
-              </a:extLst>
-            </p:cNvPr>
-            <p:cNvSpPr txBox="1"/>
-            <p:nvPr/>
-          </p:nvSpPr>
-          <p:spPr>
-            <a:xfrm>
-              <a:off x="2373899" y="3643922"/>
-              <a:ext cx="622402" cy="553998"/>
-            </a:xfrm>
-            <a:prstGeom prst="rect">
-              <a:avLst/>
-            </a:prstGeom>
+            </a:solidFill>
+            <a:tailEnd type="triangle"/>
+          </a:ln>
+        </p:spPr>
+        <p:style>
+          <a:lnRef idx="1">
+            <a:schemeClr val="accent1"/>
+          </a:lnRef>
+          <a:fillRef idx="0">
+            <a:schemeClr val="accent1"/>
+          </a:fillRef>
+          <a:effectRef idx="0">
+            <a:schemeClr val="accent1"/>
+          </a:effectRef>
+          <a:fontRef idx="minor">
+            <a:schemeClr val="tx1"/>
+          </a:fontRef>
+        </p:style>
+      </p:cxnSp>
+      <p:sp>
+        <p:nvSpPr>
+          <p:cNvPr id="85" name="TextBox 84">
+            <a:extLst>
+              <a:ext uri="{FF2B5EF4-FFF2-40B4-BE49-F238E27FC236}">
+                <a16:creationId xmlns:a16="http://schemas.microsoft.com/office/drawing/2014/main" id="{CF804AB6-B196-45FB-8F8E-BCF2A0FB4871}"/>
+              </a:ext>
+            </a:extLst>
+          </p:cNvPr>
+          <p:cNvSpPr txBox="1"/>
+          <p:nvPr/>
+        </p:nvSpPr>
+        <p:spPr>
+          <a:xfrm>
+            <a:off x="2373899" y="3643922"/>
+            <a:ext cx="622402" cy="553998"/>
+          </a:xfrm>
+          <a:prstGeom prst="rect">
+            <a:avLst/>
+          </a:prstGeom>
+          <a:solidFill>
+            <a:schemeClr val="accent2"/>
+          </a:solidFill>
+          <a:ln w="9525">
             <a:solidFill>
-              <a:schemeClr val="accent2"/>
+              <a:schemeClr val="tx1"/>
             </a:solidFill>
-            <a:ln w="9525">
-              <a:solidFill>
-                <a:schemeClr val="tx1"/>
-              </a:solidFill>
-            </a:ln>
-          </p:spPr>
-          <p:txBody>
-            <a:bodyPr wrap="square" rtlCol="0">
-              <a:spAutoFit/>
-            </a:bodyPr>
-            <a:lstStyle/>
-            <a:p>
-              <a:pPr algn="ctr"/>
-              <a:r>
-                <a:rPr lang="en-US" sz="1000" dirty="0"/>
-                <a:t>Soil aggregation</a:t>
-              </a:r>
-            </a:p>
-          </p:txBody>
-        </p:sp>
-        <p:sp>
-          <p:nvSpPr>
-            <p:cNvPr id="5" name="TextBox 4">
-              <a:extLst>
-                <a:ext uri="{FF2B5EF4-FFF2-40B4-BE49-F238E27FC236}">
-                  <a16:creationId xmlns:a16="http://schemas.microsoft.com/office/drawing/2014/main" id="{FB7D1191-B076-4898-9B0F-3270A8A581F9}"/>
-                </a:ext>
-              </a:extLst>
-            </p:cNvPr>
-            <p:cNvSpPr txBox="1"/>
-            <p:nvPr/>
-          </p:nvSpPr>
-          <p:spPr>
-            <a:xfrm>
-              <a:off x="1411035" y="1358867"/>
-              <a:ext cx="3536829" cy="276999"/>
-            </a:xfrm>
-            <a:prstGeom prst="rect">
-              <a:avLst/>
-            </a:prstGeom>
+          </a:ln>
+        </p:spPr>
+        <p:txBody>
+          <a:bodyPr wrap="square" rtlCol="0">
+            <a:spAutoFit/>
+          </a:bodyPr>
+          <a:lstStyle/>
+          <a:p>
+            <a:pPr algn="ctr"/>
+            <a:r>
+              <a:rPr lang="en-US" sz="1000" dirty="0"/>
+              <a:t>Soil aggregation</a:t>
+            </a:r>
+          </a:p>
+        </p:txBody>
+      </p:sp>
+      <p:sp>
+        <p:nvSpPr>
+          <p:cNvPr id="5" name="TextBox 4">
+            <a:extLst>
+              <a:ext uri="{FF2B5EF4-FFF2-40B4-BE49-F238E27FC236}">
+                <a16:creationId xmlns:a16="http://schemas.microsoft.com/office/drawing/2014/main" id="{FB7D1191-B076-4898-9B0F-3270A8A581F9}"/>
+              </a:ext>
+            </a:extLst>
+          </p:cNvPr>
+          <p:cNvSpPr txBox="1"/>
+          <p:nvPr/>
+        </p:nvSpPr>
+        <p:spPr>
+          <a:xfrm>
+            <a:off x="1411035" y="1358867"/>
+            <a:ext cx="3536829" cy="276999"/>
+          </a:xfrm>
+          <a:prstGeom prst="rect">
+            <a:avLst/>
+          </a:prstGeom>
+          <a:solidFill>
+            <a:schemeClr val="accent4"/>
+          </a:solidFill>
+        </p:spPr>
+        <p:txBody>
+          <a:bodyPr wrap="square" rtlCol="0">
+            <a:spAutoFit/>
+          </a:bodyPr>
+          <a:lstStyle/>
+          <a:p>
+            <a:pPr algn="ctr"/>
+            <a:r>
+              <a:rPr lang="en-US" sz="1200" dirty="0"/>
+              <a:t>Cover Crops</a:t>
+            </a:r>
+          </a:p>
+        </p:txBody>
+      </p:sp>
+      <p:sp>
+        <p:nvSpPr>
+          <p:cNvPr id="39" name="TextBox 38">
+            <a:extLst>
+              <a:ext uri="{FF2B5EF4-FFF2-40B4-BE49-F238E27FC236}">
+                <a16:creationId xmlns:a16="http://schemas.microsoft.com/office/drawing/2014/main" id="{C88535CE-04F6-4F00-8976-230E49A5674A}"/>
+              </a:ext>
+            </a:extLst>
+          </p:cNvPr>
+          <p:cNvSpPr txBox="1"/>
+          <p:nvPr/>
+        </p:nvSpPr>
+        <p:spPr>
+          <a:xfrm>
+            <a:off x="1729897" y="2961233"/>
+            <a:ext cx="1418545" cy="246221"/>
+          </a:xfrm>
+          <a:prstGeom prst="rect">
+            <a:avLst/>
+          </a:prstGeom>
+          <a:solidFill>
+            <a:schemeClr val="accent2"/>
+          </a:solidFill>
+          <a:ln w="9525">
             <a:solidFill>
-              <a:schemeClr val="accent4"/>
+              <a:schemeClr val="tx1"/>
             </a:solidFill>
-          </p:spPr>
-          <p:txBody>
-            <a:bodyPr wrap="square" rtlCol="0">
-              <a:spAutoFit/>
-            </a:bodyPr>
-            <a:lstStyle/>
-            <a:p>
-              <a:pPr algn="ctr"/>
-              <a:r>
-                <a:rPr lang="en-US" sz="1200" dirty="0"/>
-                <a:t>Cover Crops</a:t>
-              </a:r>
-            </a:p>
-          </p:txBody>
-        </p:sp>
-        <p:sp>
-          <p:nvSpPr>
-            <p:cNvPr id="39" name="TextBox 38">
-              <a:extLst>
-                <a:ext uri="{FF2B5EF4-FFF2-40B4-BE49-F238E27FC236}">
-                  <a16:creationId xmlns:a16="http://schemas.microsoft.com/office/drawing/2014/main" id="{C88535CE-04F6-4F00-8976-230E49A5674A}"/>
-                </a:ext>
-              </a:extLst>
-            </p:cNvPr>
-            <p:cNvSpPr txBox="1"/>
-            <p:nvPr/>
-          </p:nvSpPr>
-          <p:spPr>
-            <a:xfrm>
-              <a:off x="1729897" y="2961233"/>
-              <a:ext cx="1418545" cy="246221"/>
-            </a:xfrm>
-            <a:prstGeom prst="rect">
-              <a:avLst/>
-            </a:prstGeom>
+          </a:ln>
+        </p:spPr>
+        <p:txBody>
+          <a:bodyPr wrap="square" rtlCol="0">
+            <a:spAutoFit/>
+          </a:bodyPr>
+          <a:lstStyle/>
+          <a:p>
+            <a:pPr algn="ctr"/>
+            <a:r>
+              <a:rPr lang="en-US" sz="1000" dirty="0"/>
+              <a:t>Carbon inputs</a:t>
+            </a:r>
+          </a:p>
+        </p:txBody>
+      </p:sp>
+      <p:sp>
+        <p:nvSpPr>
+          <p:cNvPr id="27" name="TextBox 26">
+            <a:extLst>
+              <a:ext uri="{FF2B5EF4-FFF2-40B4-BE49-F238E27FC236}">
+                <a16:creationId xmlns:a16="http://schemas.microsoft.com/office/drawing/2014/main" id="{A8BF0BC3-B10A-4BC5-9397-D880332680E1}"/>
+              </a:ext>
+            </a:extLst>
+          </p:cNvPr>
+          <p:cNvSpPr txBox="1"/>
+          <p:nvPr/>
+        </p:nvSpPr>
+        <p:spPr>
+          <a:xfrm>
+            <a:off x="1697528" y="1955692"/>
+            <a:ext cx="660241" cy="556775"/>
+          </a:xfrm>
+          <a:prstGeom prst="rect">
+            <a:avLst/>
+          </a:prstGeom>
+          <a:solidFill>
+            <a:schemeClr val="accent2"/>
+          </a:solidFill>
+          <a:ln w="9525">
             <a:solidFill>
-              <a:schemeClr val="accent2"/>
+              <a:schemeClr val="tx1"/>
             </a:solidFill>
-            <a:ln w="9525">
-              <a:solidFill>
-                <a:schemeClr val="tx1"/>
-              </a:solidFill>
-            </a:ln>
-          </p:spPr>
-          <p:txBody>
-            <a:bodyPr wrap="square" rtlCol="0">
-              <a:spAutoFit/>
-            </a:bodyPr>
-            <a:lstStyle/>
-            <a:p>
-              <a:pPr algn="ctr"/>
-              <a:r>
-                <a:rPr lang="en-US" sz="1000" dirty="0"/>
-                <a:t>Carbon inputs</a:t>
-              </a:r>
-            </a:p>
-          </p:txBody>
-        </p:sp>
-        <p:sp>
-          <p:nvSpPr>
-            <p:cNvPr id="27" name="TextBox 26">
-              <a:extLst>
-                <a:ext uri="{FF2B5EF4-FFF2-40B4-BE49-F238E27FC236}">
-                  <a16:creationId xmlns:a16="http://schemas.microsoft.com/office/drawing/2014/main" id="{A8BF0BC3-B10A-4BC5-9397-D880332680E1}"/>
-                </a:ext>
-              </a:extLst>
-            </p:cNvPr>
-            <p:cNvSpPr txBox="1"/>
-            <p:nvPr/>
-          </p:nvSpPr>
-          <p:spPr>
-            <a:xfrm>
-              <a:off x="1697528" y="1955692"/>
-              <a:ext cx="660241" cy="556775"/>
-            </a:xfrm>
-            <a:prstGeom prst="rect">
-              <a:avLst/>
-            </a:prstGeom>
+          </a:ln>
+        </p:spPr>
+        <p:txBody>
+          <a:bodyPr wrap="square" rtlCol="0">
+            <a:spAutoFit/>
+          </a:bodyPr>
+          <a:lstStyle/>
+          <a:p>
+            <a:pPr algn="ctr"/>
+            <a:r>
+              <a:rPr lang="en-US" sz="1000" dirty="0"/>
+              <a:t>Above-ground biomass</a:t>
+            </a:r>
+          </a:p>
+        </p:txBody>
+      </p:sp>
+      <p:cxnSp>
+        <p:nvCxnSpPr>
+          <p:cNvPr id="54" name="Straight Arrow Connector 53">
+            <a:extLst>
+              <a:ext uri="{FF2B5EF4-FFF2-40B4-BE49-F238E27FC236}">
+                <a16:creationId xmlns:a16="http://schemas.microsoft.com/office/drawing/2014/main" id="{AF84A429-61E5-4732-A27D-DEAC4CF53B42}"/>
+              </a:ext>
+            </a:extLst>
+          </p:cNvPr>
+          <p:cNvCxnSpPr>
+            <a:cxnSpLocks/>
+          </p:cNvCxnSpPr>
+          <p:nvPr/>
+        </p:nvCxnSpPr>
+        <p:spPr>
+          <a:xfrm>
+            <a:off x="1145655" y="6210093"/>
+            <a:ext cx="457549" cy="0"/>
+          </a:xfrm>
+          <a:prstGeom prst="straightConnector1">
+            <a:avLst/>
+          </a:prstGeom>
+          <a:ln w="9525">
             <a:solidFill>
-              <a:schemeClr val="accent2"/>
+              <a:schemeClr val="tx1"/>
             </a:solidFill>
-            <a:ln w="9525">
-              <a:solidFill>
-                <a:schemeClr val="tx1"/>
-              </a:solidFill>
-            </a:ln>
-          </p:spPr>
-          <p:txBody>
-            <a:bodyPr wrap="square" rtlCol="0">
-              <a:spAutoFit/>
-            </a:bodyPr>
-            <a:lstStyle/>
-            <a:p>
-              <a:pPr algn="ctr"/>
-              <a:r>
-                <a:rPr lang="en-US" sz="1000" dirty="0"/>
-                <a:t>Above-ground biomass</a:t>
-              </a:r>
-            </a:p>
-          </p:txBody>
-        </p:sp>
-      </p:grpSp>
+            <a:prstDash val="dash"/>
+            <a:tailEnd type="triangle"/>
+          </a:ln>
+        </p:spPr>
+        <p:style>
+          <a:lnRef idx="1">
+            <a:schemeClr val="accent1"/>
+          </a:lnRef>
+          <a:fillRef idx="0">
+            <a:schemeClr val="accent1"/>
+          </a:fillRef>
+          <a:effectRef idx="0">
+            <a:schemeClr val="accent1"/>
+          </a:effectRef>
+          <a:fontRef idx="minor">
+            <a:schemeClr val="tx1"/>
+          </a:fontRef>
+        </p:style>
+      </p:cxnSp>
+      <p:sp>
+        <p:nvSpPr>
+          <p:cNvPr id="60" name="Rectangle 59"/>
+          <p:cNvSpPr/>
+          <p:nvPr/>
+        </p:nvSpPr>
+        <p:spPr>
+          <a:xfrm>
+            <a:off x="5485150" y="5716306"/>
+            <a:ext cx="1023066" cy="556591"/>
+          </a:xfrm>
+          <a:prstGeom prst="rect">
+            <a:avLst/>
+          </a:prstGeom>
+          <a:solidFill>
+            <a:schemeClr val="accent5"/>
+          </a:solidFill>
+        </p:spPr>
+        <p:style>
+          <a:lnRef idx="2">
+            <a:schemeClr val="accent1">
+              <a:shade val="50000"/>
+            </a:schemeClr>
+          </a:lnRef>
+          <a:fillRef idx="1">
+            <a:schemeClr val="accent1"/>
+          </a:fillRef>
+          <a:effectRef idx="0">
+            <a:schemeClr val="accent1"/>
+          </a:effectRef>
+          <a:fontRef idx="minor">
+            <a:schemeClr val="lt1"/>
+          </a:fontRef>
+        </p:style>
+        <p:txBody>
+          <a:bodyPr rtlCol="0" anchor="ctr"/>
+          <a:lstStyle/>
+          <a:p>
+            <a:pPr algn="ctr"/>
+            <a:r>
+              <a:rPr lang="en-US" sz="1200" dirty="0" smtClean="0"/>
+              <a:t>Sand content??</a:t>
+            </a:r>
+            <a:endParaRPr lang="en-US" sz="1200" dirty="0"/>
+          </a:p>
+        </p:txBody>
+      </p:sp>
+      <p:cxnSp>
+        <p:nvCxnSpPr>
+          <p:cNvPr id="61" name="Straight Arrow Connector 60">
+            <a:extLst>
+              <a:ext uri="{FF2B5EF4-FFF2-40B4-BE49-F238E27FC236}">
+                <a16:creationId xmlns:a16="http://schemas.microsoft.com/office/drawing/2014/main" id="{AF84A429-61E5-4732-A27D-DEAC4CF53B42}"/>
+              </a:ext>
+            </a:extLst>
+          </p:cNvPr>
+          <p:cNvCxnSpPr>
+            <a:cxnSpLocks/>
+          </p:cNvCxnSpPr>
+          <p:nvPr/>
+        </p:nvCxnSpPr>
+        <p:spPr>
+          <a:xfrm flipH="1">
+            <a:off x="4933717" y="6004989"/>
+            <a:ext cx="529916" cy="2916"/>
+          </a:xfrm>
+          <a:prstGeom prst="straightConnector1">
+            <a:avLst/>
+          </a:prstGeom>
+          <a:ln w="9525">
+            <a:solidFill>
+              <a:schemeClr val="tx1"/>
+            </a:solidFill>
+            <a:prstDash val="dash"/>
+            <a:tailEnd type="triangle"/>
+          </a:ln>
+        </p:spPr>
+        <p:style>
+          <a:lnRef idx="1">
+            <a:schemeClr val="accent1"/>
+          </a:lnRef>
+          <a:fillRef idx="0">
+            <a:schemeClr val="accent1"/>
+          </a:fillRef>
+          <a:effectRef idx="0">
+            <a:schemeClr val="accent1"/>
+          </a:effectRef>
+          <a:fontRef idx="minor">
+            <a:schemeClr val="tx1"/>
+          </a:fontRef>
+        </p:style>
+      </p:cxnSp>
+      <p:cxnSp>
+        <p:nvCxnSpPr>
+          <p:cNvPr id="62" name="Straight Arrow Connector 61">
+            <a:extLst>
+              <a:ext uri="{FF2B5EF4-FFF2-40B4-BE49-F238E27FC236}">
+                <a16:creationId xmlns:a16="http://schemas.microsoft.com/office/drawing/2014/main" id="{AF84A429-61E5-4732-A27D-DEAC4CF53B42}"/>
+              </a:ext>
+            </a:extLst>
+          </p:cNvPr>
+          <p:cNvCxnSpPr>
+            <a:cxnSpLocks/>
+          </p:cNvCxnSpPr>
+          <p:nvPr/>
+        </p:nvCxnSpPr>
+        <p:spPr>
+          <a:xfrm>
+            <a:off x="1127674" y="5816323"/>
+            <a:ext cx="457549" cy="0"/>
+          </a:xfrm>
+          <a:prstGeom prst="straightConnector1">
+            <a:avLst/>
+          </a:prstGeom>
+          <a:ln w="9525">
+            <a:solidFill>
+              <a:schemeClr val="tx1"/>
+            </a:solidFill>
+            <a:prstDash val="dash"/>
+            <a:tailEnd type="triangle"/>
+          </a:ln>
+        </p:spPr>
+        <p:style>
+          <a:lnRef idx="1">
+            <a:schemeClr val="accent1"/>
+          </a:lnRef>
+          <a:fillRef idx="0">
+            <a:schemeClr val="accent1"/>
+          </a:fillRef>
+          <a:effectRef idx="0">
+            <a:schemeClr val="accent1"/>
+          </a:effectRef>
+          <a:fontRef idx="minor">
+            <a:schemeClr val="tx1"/>
+          </a:fontRef>
+        </p:style>
+      </p:cxnSp>
+      <p:cxnSp>
+        <p:nvCxnSpPr>
+          <p:cNvPr id="63" name="Straight Arrow Connector 62">
+            <a:extLst>
+              <a:ext uri="{FF2B5EF4-FFF2-40B4-BE49-F238E27FC236}">
+                <a16:creationId xmlns:a16="http://schemas.microsoft.com/office/drawing/2014/main" id="{AF84A429-61E5-4732-A27D-DEAC4CF53B42}"/>
+              </a:ext>
+            </a:extLst>
+          </p:cNvPr>
+          <p:cNvCxnSpPr>
+            <a:cxnSpLocks/>
+          </p:cNvCxnSpPr>
+          <p:nvPr/>
+        </p:nvCxnSpPr>
+        <p:spPr>
+          <a:xfrm>
+            <a:off x="849505" y="4353607"/>
+            <a:ext cx="457549" cy="0"/>
+          </a:xfrm>
+          <a:prstGeom prst="straightConnector1">
+            <a:avLst/>
+          </a:prstGeom>
+          <a:ln w="9525">
+            <a:solidFill>
+              <a:schemeClr val="tx1"/>
+            </a:solidFill>
+            <a:prstDash val="dash"/>
+            <a:tailEnd type="triangle"/>
+          </a:ln>
+        </p:spPr>
+        <p:style>
+          <a:lnRef idx="1">
+            <a:schemeClr val="accent1"/>
+          </a:lnRef>
+          <a:fillRef idx="0">
+            <a:schemeClr val="accent1"/>
+          </a:fillRef>
+          <a:effectRef idx="0">
+            <a:schemeClr val="accent1"/>
+          </a:effectRef>
+          <a:fontRef idx="minor">
+            <a:schemeClr val="tx1"/>
+          </a:fontRef>
+        </p:style>
+      </p:cxnSp>
+      <p:cxnSp>
+        <p:nvCxnSpPr>
+          <p:cNvPr id="10" name="Straight Connector 9"/>
+          <p:cNvCxnSpPr/>
+          <p:nvPr/>
+        </p:nvCxnSpPr>
+        <p:spPr>
+          <a:xfrm>
+            <a:off x="834887" y="4348426"/>
+            <a:ext cx="0" cy="1420029"/>
+          </a:xfrm>
+          <a:prstGeom prst="line">
+            <a:avLst/>
+          </a:prstGeom>
+          <a:ln>
+            <a:solidFill>
+              <a:schemeClr val="tx1"/>
+            </a:solidFill>
+            <a:prstDash val="dash"/>
+          </a:ln>
+        </p:spPr>
+        <p:style>
+          <a:lnRef idx="1">
+            <a:schemeClr val="accent1"/>
+          </a:lnRef>
+          <a:fillRef idx="0">
+            <a:schemeClr val="accent1"/>
+          </a:fillRef>
+          <a:effectRef idx="0">
+            <a:schemeClr val="accent1"/>
+          </a:effectRef>
+          <a:fontRef idx="minor">
+            <a:schemeClr val="tx1"/>
+          </a:fontRef>
+        </p:style>
+      </p:cxnSp>
+      <p:sp>
+        <p:nvSpPr>
+          <p:cNvPr id="3" name="Rectangle 2"/>
+          <p:cNvSpPr/>
+          <p:nvPr/>
+        </p:nvSpPr>
+        <p:spPr>
+          <a:xfrm>
+            <a:off x="107361" y="5736914"/>
+            <a:ext cx="1023066" cy="556591"/>
+          </a:xfrm>
+          <a:prstGeom prst="rect">
+            <a:avLst/>
+          </a:prstGeom>
+          <a:solidFill>
+            <a:schemeClr val="accent5"/>
+          </a:solidFill>
+        </p:spPr>
+        <p:style>
+          <a:lnRef idx="2">
+            <a:schemeClr val="accent1">
+              <a:shade val="50000"/>
+            </a:schemeClr>
+          </a:lnRef>
+          <a:fillRef idx="1">
+            <a:schemeClr val="accent1"/>
+          </a:fillRef>
+          <a:effectRef idx="0">
+            <a:schemeClr val="accent1"/>
+          </a:effectRef>
+          <a:fontRef idx="minor">
+            <a:schemeClr val="lt1"/>
+          </a:fontRef>
+        </p:style>
+        <p:txBody>
+          <a:bodyPr rtlCol="0" anchor="ctr"/>
+          <a:lstStyle/>
+          <a:p>
+            <a:pPr algn="ctr"/>
+            <a:r>
+              <a:rPr lang="en-US" sz="1200" dirty="0" smtClean="0"/>
+              <a:t>Sand content</a:t>
+            </a:r>
+            <a:endParaRPr lang="en-US" sz="1200" dirty="0"/>
+          </a:p>
+        </p:txBody>
+      </p:sp>
     </p:spTree>
     <p:extLst>
       <p:ext uri="{BB962C8B-B14F-4D97-AF65-F5344CB8AC3E}">

</xml_diff>

<commit_message>
manu v9, new pore calcs
</commit_message>
<xml_diff>
--- a/manu/schematics-v2.pptx
+++ b/manu/schematics-v2.pptx
@@ -248,7 +248,7 @@
           <a:p>
             <a:fld id="{C1479234-584E-4873-8CD3-B53B1333C3D5}" type="datetimeFigureOut">
               <a:rPr lang="en-US" smtClean="0"/>
-              <a:t>5/26/2021</a:t>
+              <a:t>6/7/2021</a:t>
             </a:fld>
             <a:endParaRPr lang="en-US"/>
           </a:p>
@@ -418,7 +418,7 @@
           <a:p>
             <a:fld id="{C1479234-584E-4873-8CD3-B53B1333C3D5}" type="datetimeFigureOut">
               <a:rPr lang="en-US" smtClean="0"/>
-              <a:t>5/26/2021</a:t>
+              <a:t>6/7/2021</a:t>
             </a:fld>
             <a:endParaRPr lang="en-US"/>
           </a:p>
@@ -598,7 +598,7 @@
           <a:p>
             <a:fld id="{C1479234-584E-4873-8CD3-B53B1333C3D5}" type="datetimeFigureOut">
               <a:rPr lang="en-US" smtClean="0"/>
-              <a:t>5/26/2021</a:t>
+              <a:t>6/7/2021</a:t>
             </a:fld>
             <a:endParaRPr lang="en-US"/>
           </a:p>
@@ -768,7 +768,7 @@
           <a:p>
             <a:fld id="{C1479234-584E-4873-8CD3-B53B1333C3D5}" type="datetimeFigureOut">
               <a:rPr lang="en-US" smtClean="0"/>
-              <a:t>5/26/2021</a:t>
+              <a:t>6/7/2021</a:t>
             </a:fld>
             <a:endParaRPr lang="en-US"/>
           </a:p>
@@ -1012,7 +1012,7 @@
           <a:p>
             <a:fld id="{C1479234-584E-4873-8CD3-B53B1333C3D5}" type="datetimeFigureOut">
               <a:rPr lang="en-US" smtClean="0"/>
-              <a:t>5/26/2021</a:t>
+              <a:t>6/7/2021</a:t>
             </a:fld>
             <a:endParaRPr lang="en-US"/>
           </a:p>
@@ -1244,7 +1244,7 @@
           <a:p>
             <a:fld id="{C1479234-584E-4873-8CD3-B53B1333C3D5}" type="datetimeFigureOut">
               <a:rPr lang="en-US" smtClean="0"/>
-              <a:t>5/26/2021</a:t>
+              <a:t>6/7/2021</a:t>
             </a:fld>
             <a:endParaRPr lang="en-US"/>
           </a:p>
@@ -1611,7 +1611,7 @@
           <a:p>
             <a:fld id="{C1479234-584E-4873-8CD3-B53B1333C3D5}" type="datetimeFigureOut">
               <a:rPr lang="en-US" smtClean="0"/>
-              <a:t>5/26/2021</a:t>
+              <a:t>6/7/2021</a:t>
             </a:fld>
             <a:endParaRPr lang="en-US"/>
           </a:p>
@@ -1729,7 +1729,7 @@
           <a:p>
             <a:fld id="{C1479234-584E-4873-8CD3-B53B1333C3D5}" type="datetimeFigureOut">
               <a:rPr lang="en-US" smtClean="0"/>
-              <a:t>5/26/2021</a:t>
+              <a:t>6/7/2021</a:t>
             </a:fld>
             <a:endParaRPr lang="en-US"/>
           </a:p>
@@ -1824,7 +1824,7 @@
           <a:p>
             <a:fld id="{C1479234-584E-4873-8CD3-B53B1333C3D5}" type="datetimeFigureOut">
               <a:rPr lang="en-US" smtClean="0"/>
-              <a:t>5/26/2021</a:t>
+              <a:t>6/7/2021</a:t>
             </a:fld>
             <a:endParaRPr lang="en-US"/>
           </a:p>
@@ -2101,7 +2101,7 @@
           <a:p>
             <a:fld id="{C1479234-584E-4873-8CD3-B53B1333C3D5}" type="datetimeFigureOut">
               <a:rPr lang="en-US" smtClean="0"/>
-              <a:t>5/26/2021</a:t>
+              <a:t>6/7/2021</a:t>
             </a:fld>
             <a:endParaRPr lang="en-US"/>
           </a:p>
@@ -2358,7 +2358,7 @@
           <a:p>
             <a:fld id="{C1479234-584E-4873-8CD3-B53B1333C3D5}" type="datetimeFigureOut">
               <a:rPr lang="en-US" smtClean="0"/>
-              <a:t>5/26/2021</a:t>
+              <a:t>6/7/2021</a:t>
             </a:fld>
             <a:endParaRPr lang="en-US"/>
           </a:p>
@@ -2571,7 +2571,7 @@
           <a:p>
             <a:fld id="{C1479234-584E-4873-8CD3-B53B1333C3D5}" type="datetimeFigureOut">
               <a:rPr lang="en-US" smtClean="0"/>
-              <a:t>5/26/2021</a:t>
+              <a:t>6/7/2021</a:t>
             </a:fld>
             <a:endParaRPr lang="en-US"/>
           </a:p>
@@ -15711,8 +15711,13 @@
               <a:pPr algn="ctr"/>
               <a:r>
                 <a:rPr lang="en-US" sz="1200" dirty="0"/>
-                <a:t>Cover Crops</a:t>
+                <a:t>Cover </a:t>
               </a:r>
+              <a:r>
+                <a:rPr lang="en-US" sz="1200" dirty="0" smtClean="0"/>
+                <a:t>Crop</a:t>
+              </a:r>
+              <a:endParaRPr lang="en-US" sz="1200" dirty="0"/>
             </a:p>
           </p:txBody>
         </p:sp>
@@ -16929,7 +16934,6 @@
                 <a:rPr lang="en-US" sz="1200" i="1" dirty="0"/>
                 <a:t>4</a:t>
               </a:r>
-              <a:endParaRPr lang="en-US" sz="1200" i="1" dirty="0"/>
             </a:p>
           </p:txBody>
         </p:sp>

</xml_diff>